<commit_message>
rptis: specs for view
</commit_message>
<xml_diff>
--- a/docs/Workshop on Migration of RPTIS Data.pptx
+++ b/docs/Workshop on Migration of RPTIS Data.pptx
@@ -15,30 +15,33 @@
     <p:sldId id="285" r:id="rId9"/>
     <p:sldId id="286" r:id="rId10"/>
     <p:sldId id="288" r:id="rId11"/>
-    <p:sldId id="259" r:id="rId12"/>
-    <p:sldId id="289" r:id="rId13"/>
-    <p:sldId id="290" r:id="rId14"/>
-    <p:sldId id="281" r:id="rId15"/>
-    <p:sldId id="261" r:id="rId16"/>
-    <p:sldId id="263" r:id="rId17"/>
-    <p:sldId id="262" r:id="rId18"/>
-    <p:sldId id="264" r:id="rId19"/>
-    <p:sldId id="265" r:id="rId20"/>
-    <p:sldId id="266" r:id="rId21"/>
-    <p:sldId id="267" r:id="rId22"/>
-    <p:sldId id="268" r:id="rId23"/>
-    <p:sldId id="269" r:id="rId24"/>
-    <p:sldId id="287" r:id="rId25"/>
-    <p:sldId id="270" r:id="rId26"/>
-    <p:sldId id="271" r:id="rId27"/>
-    <p:sldId id="272" r:id="rId28"/>
-    <p:sldId id="273" r:id="rId29"/>
-    <p:sldId id="274" r:id="rId30"/>
-    <p:sldId id="275" r:id="rId31"/>
-    <p:sldId id="276" r:id="rId32"/>
-    <p:sldId id="277" r:id="rId33"/>
-    <p:sldId id="278" r:id="rId34"/>
-    <p:sldId id="279" r:id="rId35"/>
+    <p:sldId id="292" r:id="rId12"/>
+    <p:sldId id="291" r:id="rId13"/>
+    <p:sldId id="259" r:id="rId14"/>
+    <p:sldId id="289" r:id="rId15"/>
+    <p:sldId id="290" r:id="rId16"/>
+    <p:sldId id="281" r:id="rId17"/>
+    <p:sldId id="261" r:id="rId18"/>
+    <p:sldId id="263" r:id="rId19"/>
+    <p:sldId id="262" r:id="rId20"/>
+    <p:sldId id="264" r:id="rId21"/>
+    <p:sldId id="265" r:id="rId22"/>
+    <p:sldId id="266" r:id="rId23"/>
+    <p:sldId id="267" r:id="rId24"/>
+    <p:sldId id="268" r:id="rId25"/>
+    <p:sldId id="269" r:id="rId26"/>
+    <p:sldId id="287" r:id="rId27"/>
+    <p:sldId id="270" r:id="rId28"/>
+    <p:sldId id="271" r:id="rId29"/>
+    <p:sldId id="293" r:id="rId30"/>
+    <p:sldId id="272" r:id="rId31"/>
+    <p:sldId id="273" r:id="rId32"/>
+    <p:sldId id="274" r:id="rId33"/>
+    <p:sldId id="275" r:id="rId34"/>
+    <p:sldId id="276" r:id="rId35"/>
+    <p:sldId id="277" r:id="rId36"/>
+    <p:sldId id="278" r:id="rId37"/>
+    <p:sldId id="279" r:id="rId38"/>
   </p:sldIdLst>
   <p:sldSz cx="9144000" cy="6858000" type="screen4x3"/>
   <p:notesSz cx="6858000" cy="9144000"/>
@@ -4015,7 +4018,18 @@
           <a:p>
             <a:r>
               <a:rPr lang="en-US" dirty="0" smtClean="0"/>
-              <a:t>Organization</a:t>
+              <a:t>Migration Script and </a:t>
+            </a:r>
+            <a:br>
+              <a:rPr lang="en-US" dirty="0" smtClean="0"/>
+            </a:br>
+            <a:r>
+              <a:rPr lang="en-US" dirty="0" smtClean="0"/>
+              <a:t>Test </a:t>
+            </a:r>
+            <a:r>
+              <a:rPr lang="en-US" dirty="0" smtClean="0"/>
+              <a:t>Flow</a:t>
             </a:r>
             <a:endParaRPr lang="en-US" dirty="0"/>
           </a:p>
@@ -4087,7 +4101,7 @@
           <a:p>
             <a:r>
               <a:rPr lang="en-US" dirty="0" smtClean="0"/>
-              <a:t>Organization</a:t>
+              <a:t>Process Flow</a:t>
             </a:r>
             <a:endParaRPr lang="en-US" dirty="0"/>
           </a:p>
@@ -4095,50 +4109,1148 @@
       </p:sp>
       <p:sp>
         <p:nvSpPr>
-          <p:cNvPr id="5" name="Content Placeholder 4"/>
-          <p:cNvSpPr>
-            <a:spLocks noGrp="1"/>
-          </p:cNvSpPr>
-          <p:nvPr>
-            <p:ph idx="1"/>
-          </p:nvPr>
-        </p:nvSpPr>
-        <p:spPr/>
-        <p:txBody>
-          <a:bodyPr/>
-          <a:lstStyle/>
-          <a:p>
-            <a:r>
-              <a:rPr lang="en-US" dirty="0" err="1" smtClean="0"/>
-              <a:t>Sys_Org</a:t>
-            </a:r>
-            <a:endParaRPr lang="en-US" dirty="0" smtClean="0"/>
-          </a:p>
-          <a:p>
-            <a:r>
-              <a:rPr lang="en-US" dirty="0" smtClean="0"/>
-              <a:t>Province</a:t>
-            </a:r>
-          </a:p>
-          <a:p>
-            <a:r>
-              <a:rPr lang="en-US" dirty="0" smtClean="0"/>
-              <a:t>Municipality</a:t>
-            </a:r>
-          </a:p>
-          <a:p>
-            <a:r>
-              <a:rPr lang="en-US" dirty="0" smtClean="0"/>
-              <a:t>Barangay</a:t>
-            </a:r>
-            <a:endParaRPr lang="en-US" dirty="0"/>
-          </a:p>
-        </p:txBody>
-      </p:sp>
+          <p:cNvPr id="8" name="Rectangle 7"/>
+          <p:cNvSpPr/>
+          <p:nvPr/>
+        </p:nvSpPr>
+        <p:spPr>
+          <a:xfrm>
+            <a:off x="381000" y="1981200"/>
+            <a:ext cx="2743200" cy="381000"/>
+          </a:xfrm>
+          <a:prstGeom prst="rect">
+            <a:avLst/>
+          </a:prstGeom>
+        </p:spPr>
+        <p:style>
+          <a:lnRef idx="1">
+            <a:schemeClr val="accent3"/>
+          </a:lnRef>
+          <a:fillRef idx="2">
+            <a:schemeClr val="accent3"/>
+          </a:fillRef>
+          <a:effectRef idx="1">
+            <a:schemeClr val="accent3"/>
+          </a:effectRef>
+          <a:fontRef idx="minor">
+            <a:schemeClr val="dk1"/>
+          </a:fontRef>
+        </p:style>
+        <p:txBody>
+          <a:bodyPr rtlCol="0" anchor="ctr"/>
+          <a:lstStyle/>
+          <a:p>
+            <a:pPr algn="ctr"/>
+            <a:r>
+              <a:rPr lang="en-US" dirty="0" smtClean="0">
+                <a:latin typeface="+mj-lt"/>
+              </a:rPr>
+              <a:t>RSI</a:t>
+            </a:r>
+            <a:endParaRPr lang="en-US" dirty="0">
+              <a:latin typeface="+mj-lt"/>
+            </a:endParaRPr>
+          </a:p>
+        </p:txBody>
+      </p:sp>
+      <p:sp>
+        <p:nvSpPr>
+          <p:cNvPr id="9" name="Rectangle 8"/>
+          <p:cNvSpPr/>
+          <p:nvPr/>
+        </p:nvSpPr>
+        <p:spPr>
+          <a:xfrm>
+            <a:off x="3124200" y="1981200"/>
+            <a:ext cx="2743200" cy="381000"/>
+          </a:xfrm>
+          <a:prstGeom prst="rect">
+            <a:avLst/>
+          </a:prstGeom>
+        </p:spPr>
+        <p:style>
+          <a:lnRef idx="1">
+            <a:schemeClr val="accent5"/>
+          </a:lnRef>
+          <a:fillRef idx="2">
+            <a:schemeClr val="accent5"/>
+          </a:fillRef>
+          <a:effectRef idx="1">
+            <a:schemeClr val="accent5"/>
+          </a:effectRef>
+          <a:fontRef idx="minor">
+            <a:schemeClr val="dk1"/>
+          </a:fontRef>
+        </p:style>
+        <p:txBody>
+          <a:bodyPr rtlCol="0" anchor="ctr"/>
+          <a:lstStyle/>
+          <a:p>
+            <a:pPr algn="ctr"/>
+            <a:r>
+              <a:rPr lang="en-US" dirty="0" smtClean="0">
+                <a:latin typeface="+mj-lt"/>
+              </a:rPr>
+              <a:t>Province / BICTO</a:t>
+            </a:r>
+            <a:endParaRPr lang="en-US" dirty="0">
+              <a:latin typeface="+mj-lt"/>
+            </a:endParaRPr>
+          </a:p>
+        </p:txBody>
+      </p:sp>
+      <p:sp>
+        <p:nvSpPr>
+          <p:cNvPr id="10" name="Rectangle 9"/>
+          <p:cNvSpPr/>
+          <p:nvPr/>
+        </p:nvSpPr>
+        <p:spPr>
+          <a:xfrm>
+            <a:off x="5867400" y="1981200"/>
+            <a:ext cx="2743200" cy="381000"/>
+          </a:xfrm>
+          <a:prstGeom prst="rect">
+            <a:avLst/>
+          </a:prstGeom>
+        </p:spPr>
+        <p:style>
+          <a:lnRef idx="1">
+            <a:schemeClr val="accent2"/>
+          </a:lnRef>
+          <a:fillRef idx="3">
+            <a:schemeClr val="accent2"/>
+          </a:fillRef>
+          <a:effectRef idx="2">
+            <a:schemeClr val="accent2"/>
+          </a:effectRef>
+          <a:fontRef idx="minor">
+            <a:schemeClr val="lt1"/>
+          </a:fontRef>
+        </p:style>
+        <p:txBody>
+          <a:bodyPr rtlCol="0" anchor="ctr"/>
+          <a:lstStyle/>
+          <a:p>
+            <a:pPr algn="ctr"/>
+            <a:r>
+              <a:rPr lang="en-US" dirty="0" smtClean="0">
+                <a:latin typeface="+mj-lt"/>
+              </a:rPr>
+              <a:t>Municipal IT</a:t>
+            </a:r>
+            <a:endParaRPr lang="en-US" dirty="0">
+              <a:latin typeface="+mj-lt"/>
+            </a:endParaRPr>
+          </a:p>
+        </p:txBody>
+      </p:sp>
+      <p:sp>
+        <p:nvSpPr>
+          <p:cNvPr id="11" name="Rectangle 10"/>
+          <p:cNvSpPr/>
+          <p:nvPr/>
+        </p:nvSpPr>
+        <p:spPr>
+          <a:xfrm>
+            <a:off x="533400" y="3048000"/>
+            <a:ext cx="2057400" cy="609600"/>
+          </a:xfrm>
+          <a:prstGeom prst="rect">
+            <a:avLst/>
+          </a:prstGeom>
+        </p:spPr>
+        <p:style>
+          <a:lnRef idx="1">
+            <a:schemeClr val="accent3"/>
+          </a:lnRef>
+          <a:fillRef idx="2">
+            <a:schemeClr val="accent3"/>
+          </a:fillRef>
+          <a:effectRef idx="1">
+            <a:schemeClr val="accent3"/>
+          </a:effectRef>
+          <a:fontRef idx="minor">
+            <a:schemeClr val="dk1"/>
+          </a:fontRef>
+        </p:style>
+        <p:txBody>
+          <a:bodyPr rtlCol="0" anchor="ctr"/>
+          <a:lstStyle/>
+          <a:p>
+            <a:pPr algn="ctr"/>
+            <a:r>
+              <a:rPr lang="en-US" sz="1200" dirty="0" smtClean="0">
+                <a:latin typeface="+mj-lt"/>
+              </a:rPr>
+              <a:t>Document and Prepare View Templates</a:t>
+            </a:r>
+            <a:endParaRPr lang="en-US" sz="1200" dirty="0">
+              <a:latin typeface="+mj-lt"/>
+            </a:endParaRPr>
+          </a:p>
+        </p:txBody>
+      </p:sp>
+      <p:sp>
+        <p:nvSpPr>
+          <p:cNvPr id="12" name="Rectangle 11"/>
+          <p:cNvSpPr/>
+          <p:nvPr/>
+        </p:nvSpPr>
+        <p:spPr>
+          <a:xfrm>
+            <a:off x="3429000" y="3048000"/>
+            <a:ext cx="2057400" cy="609600"/>
+          </a:xfrm>
+          <a:prstGeom prst="rect">
+            <a:avLst/>
+          </a:prstGeom>
+        </p:spPr>
+        <p:style>
+          <a:lnRef idx="1">
+            <a:schemeClr val="accent5"/>
+          </a:lnRef>
+          <a:fillRef idx="2">
+            <a:schemeClr val="accent5"/>
+          </a:fillRef>
+          <a:effectRef idx="1">
+            <a:schemeClr val="accent5"/>
+          </a:effectRef>
+          <a:fontRef idx="minor">
+            <a:schemeClr val="dk1"/>
+          </a:fontRef>
+        </p:style>
+        <p:txBody>
+          <a:bodyPr rtlCol="0" anchor="ctr"/>
+          <a:lstStyle/>
+          <a:p>
+            <a:pPr algn="ctr"/>
+            <a:r>
+              <a:rPr lang="en-US" sz="1200" dirty="0" smtClean="0">
+                <a:latin typeface="+mj-lt"/>
+              </a:rPr>
+              <a:t>Generate View SQL and associated scripts</a:t>
+            </a:r>
+            <a:endParaRPr lang="en-US" sz="1200" dirty="0">
+              <a:latin typeface="+mj-lt"/>
+            </a:endParaRPr>
+          </a:p>
+        </p:txBody>
+      </p:sp>
+      <p:sp>
+        <p:nvSpPr>
+          <p:cNvPr id="13" name="Rectangle 12"/>
+          <p:cNvSpPr/>
+          <p:nvPr/>
+        </p:nvSpPr>
+        <p:spPr>
+          <a:xfrm>
+            <a:off x="6210300" y="3048000"/>
+            <a:ext cx="2057400" cy="609600"/>
+          </a:xfrm>
+          <a:prstGeom prst="rect">
+            <a:avLst/>
+          </a:prstGeom>
+        </p:spPr>
+        <p:style>
+          <a:lnRef idx="1">
+            <a:schemeClr val="accent2"/>
+          </a:lnRef>
+          <a:fillRef idx="2">
+            <a:schemeClr val="accent2"/>
+          </a:fillRef>
+          <a:effectRef idx="1">
+            <a:schemeClr val="accent2"/>
+          </a:effectRef>
+          <a:fontRef idx="minor">
+            <a:schemeClr val="dk1"/>
+          </a:fontRef>
+        </p:style>
+        <p:txBody>
+          <a:bodyPr rtlCol="0" anchor="ctr"/>
+          <a:lstStyle/>
+          <a:p>
+            <a:pPr algn="ctr"/>
+            <a:r>
+              <a:rPr lang="en-US" sz="1200" dirty="0" smtClean="0">
+                <a:latin typeface="+mj-lt"/>
+              </a:rPr>
+              <a:t>Execute scripts and document errors</a:t>
+            </a:r>
+            <a:endParaRPr lang="en-US" sz="1200" dirty="0">
+              <a:latin typeface="+mj-lt"/>
+            </a:endParaRPr>
+          </a:p>
+        </p:txBody>
+      </p:sp>
+      <p:cxnSp>
+        <p:nvCxnSpPr>
+          <p:cNvPr id="15" name="Straight Arrow Connector 14"/>
+          <p:cNvCxnSpPr>
+            <a:stCxn id="11" idx="3"/>
+            <a:endCxn id="12" idx="1"/>
+          </p:cNvCxnSpPr>
+          <p:nvPr/>
+        </p:nvCxnSpPr>
+        <p:spPr>
+          <a:xfrm>
+            <a:off x="2590800" y="3352800"/>
+            <a:ext cx="838200" cy="0"/>
+          </a:xfrm>
+          <a:prstGeom prst="straightConnector1">
+            <a:avLst/>
+          </a:prstGeom>
+          <a:ln w="19050">
+            <a:tailEnd type="arrow"/>
+          </a:ln>
+        </p:spPr>
+        <p:style>
+          <a:lnRef idx="1">
+            <a:schemeClr val="accent1"/>
+          </a:lnRef>
+          <a:fillRef idx="0">
+            <a:schemeClr val="accent1"/>
+          </a:fillRef>
+          <a:effectRef idx="0">
+            <a:schemeClr val="accent1"/>
+          </a:effectRef>
+          <a:fontRef idx="minor">
+            <a:schemeClr val="tx1"/>
+          </a:fontRef>
+        </p:style>
+      </p:cxnSp>
+      <p:sp>
+        <p:nvSpPr>
+          <p:cNvPr id="17" name="Rectangle 16"/>
+          <p:cNvSpPr/>
+          <p:nvPr/>
+        </p:nvSpPr>
+        <p:spPr>
+          <a:xfrm>
+            <a:off x="533400" y="3800743"/>
+            <a:ext cx="2057400" cy="557897"/>
+          </a:xfrm>
+          <a:prstGeom prst="rect">
+            <a:avLst/>
+          </a:prstGeom>
+        </p:spPr>
+        <p:style>
+          <a:lnRef idx="1">
+            <a:schemeClr val="accent3"/>
+          </a:lnRef>
+          <a:fillRef idx="2">
+            <a:schemeClr val="accent3"/>
+          </a:fillRef>
+          <a:effectRef idx="1">
+            <a:schemeClr val="accent3"/>
+          </a:effectRef>
+          <a:fontRef idx="minor">
+            <a:schemeClr val="dk1"/>
+          </a:fontRef>
+        </p:style>
+        <p:txBody>
+          <a:bodyPr rtlCol="0" anchor="ctr"/>
+          <a:lstStyle/>
+          <a:p>
+            <a:pPr algn="ctr"/>
+            <a:r>
+              <a:rPr lang="en-US" sz="1200" dirty="0" smtClean="0">
+                <a:latin typeface="+mj-lt"/>
+              </a:rPr>
+              <a:t>Execute View, Verify and Validate ETRACS Data</a:t>
+            </a:r>
+            <a:endParaRPr lang="en-US" sz="1200" dirty="0">
+              <a:latin typeface="+mj-lt"/>
+            </a:endParaRPr>
+          </a:p>
+        </p:txBody>
+      </p:sp>
+      <p:cxnSp>
+        <p:nvCxnSpPr>
+          <p:cNvPr id="19" name="Elbow Connector 18"/>
+          <p:cNvCxnSpPr>
+            <a:stCxn id="12" idx="2"/>
+          </p:cNvCxnSpPr>
+          <p:nvPr/>
+        </p:nvCxnSpPr>
+        <p:spPr>
+          <a:xfrm rot="5400000">
+            <a:off x="3371850" y="2876550"/>
+            <a:ext cx="304800" cy="1866900"/>
+          </a:xfrm>
+          <a:prstGeom prst="bentConnector2">
+            <a:avLst/>
+          </a:prstGeom>
+          <a:ln w="19050">
+            <a:tailEnd type="arrow"/>
+          </a:ln>
+        </p:spPr>
+        <p:style>
+          <a:lnRef idx="1">
+            <a:schemeClr val="accent1"/>
+          </a:lnRef>
+          <a:fillRef idx="0">
+            <a:schemeClr val="accent1"/>
+          </a:fillRef>
+          <a:effectRef idx="0">
+            <a:schemeClr val="accent1"/>
+          </a:effectRef>
+          <a:fontRef idx="minor">
+            <a:schemeClr val="tx1"/>
+          </a:fontRef>
+        </p:style>
+      </p:cxnSp>
+      <p:sp>
+        <p:nvSpPr>
+          <p:cNvPr id="22" name="Flowchart: Decision 21"/>
+          <p:cNvSpPr/>
+          <p:nvPr/>
+        </p:nvSpPr>
+        <p:spPr>
+          <a:xfrm>
+            <a:off x="952500" y="4598432"/>
+            <a:ext cx="1219200" cy="446318"/>
+          </a:xfrm>
+          <a:prstGeom prst="flowChartDecision">
+            <a:avLst/>
+          </a:prstGeom>
+        </p:spPr>
+        <p:style>
+          <a:lnRef idx="1">
+            <a:schemeClr val="accent3"/>
+          </a:lnRef>
+          <a:fillRef idx="2">
+            <a:schemeClr val="accent3"/>
+          </a:fillRef>
+          <a:effectRef idx="1">
+            <a:schemeClr val="accent3"/>
+          </a:effectRef>
+          <a:fontRef idx="minor">
+            <a:schemeClr val="dk1"/>
+          </a:fontRef>
+        </p:style>
+        <p:txBody>
+          <a:bodyPr rtlCol="0" anchor="ctr"/>
+          <a:lstStyle/>
+          <a:p>
+            <a:pPr algn="ctr"/>
+            <a:r>
+              <a:rPr lang="en-US" sz="1100" dirty="0" smtClean="0">
+                <a:latin typeface="+mj-lt"/>
+              </a:rPr>
+              <a:t>Error?</a:t>
+            </a:r>
+            <a:endParaRPr lang="en-US" sz="1100" dirty="0">
+              <a:latin typeface="+mj-lt"/>
+            </a:endParaRPr>
+          </a:p>
+        </p:txBody>
+      </p:sp>
+      <p:cxnSp>
+        <p:nvCxnSpPr>
+          <p:cNvPr id="24" name="Straight Arrow Connector 23"/>
+          <p:cNvCxnSpPr>
+            <a:stCxn id="17" idx="2"/>
+            <a:endCxn id="22" idx="0"/>
+          </p:cNvCxnSpPr>
+          <p:nvPr/>
+        </p:nvCxnSpPr>
+        <p:spPr>
+          <a:xfrm>
+            <a:off x="1562100" y="4358640"/>
+            <a:ext cx="0" cy="239792"/>
+          </a:xfrm>
+          <a:prstGeom prst="straightConnector1">
+            <a:avLst/>
+          </a:prstGeom>
+          <a:ln w="19050">
+            <a:tailEnd type="arrow"/>
+          </a:ln>
+        </p:spPr>
+        <p:style>
+          <a:lnRef idx="1">
+            <a:schemeClr val="accent1"/>
+          </a:lnRef>
+          <a:fillRef idx="0">
+            <a:schemeClr val="accent1"/>
+          </a:fillRef>
+          <a:effectRef idx="0">
+            <a:schemeClr val="accent1"/>
+          </a:effectRef>
+          <a:fontRef idx="minor">
+            <a:schemeClr val="tx1"/>
+          </a:fontRef>
+        </p:style>
+      </p:cxnSp>
+      <p:sp>
+        <p:nvSpPr>
+          <p:cNvPr id="25" name="Rectangle 24"/>
+          <p:cNvSpPr/>
+          <p:nvPr/>
+        </p:nvSpPr>
+        <p:spPr>
+          <a:xfrm>
+            <a:off x="3421380" y="4594860"/>
+            <a:ext cx="2057400" cy="457476"/>
+          </a:xfrm>
+          <a:prstGeom prst="rect">
+            <a:avLst/>
+          </a:prstGeom>
+        </p:spPr>
+        <p:style>
+          <a:lnRef idx="1">
+            <a:schemeClr val="accent5"/>
+          </a:lnRef>
+          <a:fillRef idx="2">
+            <a:schemeClr val="accent5"/>
+          </a:fillRef>
+          <a:effectRef idx="1">
+            <a:schemeClr val="accent5"/>
+          </a:effectRef>
+          <a:fontRef idx="minor">
+            <a:schemeClr val="dk1"/>
+          </a:fontRef>
+        </p:style>
+        <p:txBody>
+          <a:bodyPr rtlCol="0" anchor="ctr"/>
+          <a:lstStyle/>
+          <a:p>
+            <a:pPr algn="ctr"/>
+            <a:r>
+              <a:rPr lang="en-US" sz="1200" dirty="0" smtClean="0">
+                <a:latin typeface="+mj-lt"/>
+              </a:rPr>
+              <a:t>Correct View Statement to fix reported errors</a:t>
+            </a:r>
+            <a:endParaRPr lang="en-US" sz="1200" dirty="0">
+              <a:latin typeface="+mj-lt"/>
+            </a:endParaRPr>
+          </a:p>
+        </p:txBody>
+      </p:sp>
+      <p:cxnSp>
+        <p:nvCxnSpPr>
+          <p:cNvPr id="27" name="Straight Arrow Connector 26"/>
+          <p:cNvCxnSpPr>
+            <a:stCxn id="22" idx="3"/>
+            <a:endCxn id="25" idx="1"/>
+          </p:cNvCxnSpPr>
+          <p:nvPr/>
+        </p:nvCxnSpPr>
+        <p:spPr>
+          <a:xfrm>
+            <a:off x="2171700" y="4821591"/>
+            <a:ext cx="1249680" cy="2007"/>
+          </a:xfrm>
+          <a:prstGeom prst="straightConnector1">
+            <a:avLst/>
+          </a:prstGeom>
+          <a:ln w="19050">
+            <a:tailEnd type="arrow"/>
+          </a:ln>
+        </p:spPr>
+        <p:style>
+          <a:lnRef idx="1">
+            <a:schemeClr val="accent1"/>
+          </a:lnRef>
+          <a:fillRef idx="0">
+            <a:schemeClr val="accent1"/>
+          </a:fillRef>
+          <a:effectRef idx="0">
+            <a:schemeClr val="accent1"/>
+          </a:effectRef>
+          <a:fontRef idx="minor">
+            <a:schemeClr val="tx1"/>
+          </a:fontRef>
+        </p:style>
+      </p:cxnSp>
+      <p:cxnSp>
+        <p:nvCxnSpPr>
+          <p:cNvPr id="31" name="Elbow Connector 30"/>
+          <p:cNvCxnSpPr>
+            <a:stCxn id="25" idx="0"/>
+          </p:cNvCxnSpPr>
+          <p:nvPr/>
+        </p:nvCxnSpPr>
+        <p:spPr>
+          <a:xfrm rot="16200000" flipV="1">
+            <a:off x="3322397" y="3467177"/>
+            <a:ext cx="396086" cy="1859280"/>
+          </a:xfrm>
+          <a:prstGeom prst="bentConnector2">
+            <a:avLst/>
+          </a:prstGeom>
+          <a:ln w="19050">
+            <a:tailEnd type="arrow"/>
+          </a:ln>
+        </p:spPr>
+        <p:style>
+          <a:lnRef idx="1">
+            <a:schemeClr val="accent1"/>
+          </a:lnRef>
+          <a:fillRef idx="0">
+            <a:schemeClr val="accent1"/>
+          </a:fillRef>
+          <a:effectRef idx="0">
+            <a:schemeClr val="accent1"/>
+          </a:effectRef>
+          <a:fontRef idx="minor">
+            <a:schemeClr val="tx1"/>
+          </a:fontRef>
+        </p:style>
+      </p:cxnSp>
+      <p:sp>
+        <p:nvSpPr>
+          <p:cNvPr id="33" name="TextBox 32"/>
+          <p:cNvSpPr txBox="1"/>
+          <p:nvPr/>
+        </p:nvSpPr>
+        <p:spPr>
+          <a:xfrm>
+            <a:off x="2115594" y="4572000"/>
+            <a:ext cx="377026" cy="261610"/>
+          </a:xfrm>
+          <a:prstGeom prst="rect">
+            <a:avLst/>
+          </a:prstGeom>
+          <a:noFill/>
+        </p:spPr>
+        <p:txBody>
+          <a:bodyPr wrap="none" rtlCol="0">
+            <a:spAutoFit/>
+          </a:bodyPr>
+          <a:lstStyle/>
+          <a:p>
+            <a:r>
+              <a:rPr lang="en-US" sz="1100" dirty="0" smtClean="0">
+                <a:latin typeface="+mj-lt"/>
+              </a:rPr>
+              <a:t>yes</a:t>
+            </a:r>
+            <a:endParaRPr lang="en-US" sz="1100" dirty="0">
+              <a:latin typeface="+mj-lt"/>
+            </a:endParaRPr>
+          </a:p>
+        </p:txBody>
+      </p:sp>
+      <p:cxnSp>
+        <p:nvCxnSpPr>
+          <p:cNvPr id="36" name="Elbow Connector 35"/>
+          <p:cNvCxnSpPr>
+            <a:stCxn id="22" idx="2"/>
+            <a:endCxn id="13" idx="1"/>
+          </p:cNvCxnSpPr>
+          <p:nvPr/>
+        </p:nvCxnSpPr>
+        <p:spPr>
+          <a:xfrm rot="5400000" flipH="1" flipV="1">
+            <a:off x="3040225" y="1874675"/>
+            <a:ext cx="1691950" cy="4648200"/>
+          </a:xfrm>
+          <a:prstGeom prst="bentConnector4">
+            <a:avLst>
+              <a:gd name="adj1" fmla="val -13511"/>
+              <a:gd name="adj2" fmla="val 93442"/>
+            </a:avLst>
+          </a:prstGeom>
+          <a:ln w="19050">
+            <a:tailEnd type="arrow"/>
+          </a:ln>
+        </p:spPr>
+        <p:style>
+          <a:lnRef idx="1">
+            <a:schemeClr val="accent1"/>
+          </a:lnRef>
+          <a:fillRef idx="0">
+            <a:schemeClr val="accent1"/>
+          </a:fillRef>
+          <a:effectRef idx="0">
+            <a:schemeClr val="accent1"/>
+          </a:effectRef>
+          <a:fontRef idx="minor">
+            <a:schemeClr val="tx1"/>
+          </a:fontRef>
+        </p:style>
+      </p:cxnSp>
+      <p:sp>
+        <p:nvSpPr>
+          <p:cNvPr id="38" name="TextBox 37"/>
+          <p:cNvSpPr txBox="1"/>
+          <p:nvPr/>
+        </p:nvSpPr>
+        <p:spPr>
+          <a:xfrm>
+            <a:off x="1592580" y="5029200"/>
+            <a:ext cx="343364" cy="261610"/>
+          </a:xfrm>
+          <a:prstGeom prst="rect">
+            <a:avLst/>
+          </a:prstGeom>
+          <a:noFill/>
+        </p:spPr>
+        <p:txBody>
+          <a:bodyPr wrap="none" rtlCol="0">
+            <a:spAutoFit/>
+          </a:bodyPr>
+          <a:lstStyle/>
+          <a:p>
+            <a:r>
+              <a:rPr lang="en-US" sz="1100" dirty="0" smtClean="0">
+                <a:latin typeface="+mj-lt"/>
+              </a:rPr>
+              <a:t>no</a:t>
+            </a:r>
+            <a:endParaRPr lang="en-US" sz="1100" dirty="0">
+              <a:latin typeface="+mj-lt"/>
+            </a:endParaRPr>
+          </a:p>
+        </p:txBody>
+      </p:sp>
+      <p:sp>
+        <p:nvSpPr>
+          <p:cNvPr id="48" name="Flowchart: Decision 47"/>
+          <p:cNvSpPr/>
+          <p:nvPr/>
+        </p:nvSpPr>
+        <p:spPr>
+          <a:xfrm>
+            <a:off x="6629400" y="4598122"/>
+            <a:ext cx="1219200" cy="446318"/>
+          </a:xfrm>
+          <a:prstGeom prst="flowChartDecision">
+            <a:avLst/>
+          </a:prstGeom>
+        </p:spPr>
+        <p:style>
+          <a:lnRef idx="1">
+            <a:schemeClr val="accent2"/>
+          </a:lnRef>
+          <a:fillRef idx="2">
+            <a:schemeClr val="accent2"/>
+          </a:fillRef>
+          <a:effectRef idx="1">
+            <a:schemeClr val="accent2"/>
+          </a:effectRef>
+          <a:fontRef idx="minor">
+            <a:schemeClr val="dk1"/>
+          </a:fontRef>
+        </p:style>
+        <p:txBody>
+          <a:bodyPr rtlCol="0" anchor="ctr"/>
+          <a:lstStyle/>
+          <a:p>
+            <a:pPr algn="ctr"/>
+            <a:r>
+              <a:rPr lang="en-US" sz="1100" dirty="0" smtClean="0">
+                <a:latin typeface="+mj-lt"/>
+              </a:rPr>
+              <a:t>Error?</a:t>
+            </a:r>
+            <a:endParaRPr lang="en-US" sz="1100" dirty="0">
+              <a:latin typeface="+mj-lt"/>
+            </a:endParaRPr>
+          </a:p>
+        </p:txBody>
+      </p:sp>
+      <p:cxnSp>
+        <p:nvCxnSpPr>
+          <p:cNvPr id="50" name="Straight Arrow Connector 49"/>
+          <p:cNvCxnSpPr>
+            <a:stCxn id="13" idx="2"/>
+            <a:endCxn id="48" idx="0"/>
+          </p:cNvCxnSpPr>
+          <p:nvPr/>
+        </p:nvCxnSpPr>
+        <p:spPr>
+          <a:xfrm>
+            <a:off x="7239000" y="3657600"/>
+            <a:ext cx="0" cy="940522"/>
+          </a:xfrm>
+          <a:prstGeom prst="straightConnector1">
+            <a:avLst/>
+          </a:prstGeom>
+          <a:ln w="19050">
+            <a:tailEnd type="arrow"/>
+          </a:ln>
+        </p:spPr>
+        <p:style>
+          <a:lnRef idx="1">
+            <a:schemeClr val="accent1"/>
+          </a:lnRef>
+          <a:fillRef idx="0">
+            <a:schemeClr val="accent1"/>
+          </a:fillRef>
+          <a:effectRef idx="0">
+            <a:schemeClr val="accent1"/>
+          </a:effectRef>
+          <a:fontRef idx="minor">
+            <a:schemeClr val="tx1"/>
+          </a:fontRef>
+        </p:style>
+      </p:cxnSp>
+      <p:cxnSp>
+        <p:nvCxnSpPr>
+          <p:cNvPr id="52" name="Straight Arrow Connector 51"/>
+          <p:cNvCxnSpPr>
+            <a:stCxn id="48" idx="1"/>
+            <a:endCxn id="25" idx="3"/>
+          </p:cNvCxnSpPr>
+          <p:nvPr/>
+        </p:nvCxnSpPr>
+        <p:spPr>
+          <a:xfrm flipH="1">
+            <a:off x="5478780" y="4821281"/>
+            <a:ext cx="1150620" cy="2317"/>
+          </a:xfrm>
+          <a:prstGeom prst="straightConnector1">
+            <a:avLst/>
+          </a:prstGeom>
+          <a:ln w="19050">
+            <a:tailEnd type="arrow"/>
+          </a:ln>
+        </p:spPr>
+        <p:style>
+          <a:lnRef idx="1">
+            <a:schemeClr val="accent1"/>
+          </a:lnRef>
+          <a:fillRef idx="0">
+            <a:schemeClr val="accent1"/>
+          </a:fillRef>
+          <a:effectRef idx="0">
+            <a:schemeClr val="accent1"/>
+          </a:effectRef>
+          <a:fontRef idx="minor">
+            <a:schemeClr val="tx1"/>
+          </a:fontRef>
+        </p:style>
+      </p:cxnSp>
+      <p:sp>
+        <p:nvSpPr>
+          <p:cNvPr id="53" name="TextBox 52"/>
+          <p:cNvSpPr txBox="1"/>
+          <p:nvPr/>
+        </p:nvSpPr>
+        <p:spPr>
+          <a:xfrm>
+            <a:off x="6252374" y="4559671"/>
+            <a:ext cx="377026" cy="261610"/>
+          </a:xfrm>
+          <a:prstGeom prst="rect">
+            <a:avLst/>
+          </a:prstGeom>
+          <a:noFill/>
+        </p:spPr>
+        <p:txBody>
+          <a:bodyPr wrap="none" rtlCol="0">
+            <a:spAutoFit/>
+          </a:bodyPr>
+          <a:lstStyle/>
+          <a:p>
+            <a:r>
+              <a:rPr lang="en-US" sz="1100" dirty="0" smtClean="0">
+                <a:latin typeface="+mj-lt"/>
+              </a:rPr>
+              <a:t>yes</a:t>
+            </a:r>
+            <a:endParaRPr lang="en-US" sz="1100" dirty="0">
+              <a:latin typeface="+mj-lt"/>
+            </a:endParaRPr>
+          </a:p>
+        </p:txBody>
+      </p:sp>
+      <p:sp>
+        <p:nvSpPr>
+          <p:cNvPr id="54" name="Rectangle 53"/>
+          <p:cNvSpPr/>
+          <p:nvPr/>
+        </p:nvSpPr>
+        <p:spPr>
+          <a:xfrm>
+            <a:off x="723900" y="5410200"/>
+            <a:ext cx="1638300" cy="557897"/>
+          </a:xfrm>
+          <a:prstGeom prst="rect">
+            <a:avLst/>
+          </a:prstGeom>
+        </p:spPr>
+        <p:style>
+          <a:lnRef idx="1">
+            <a:schemeClr val="accent3"/>
+          </a:lnRef>
+          <a:fillRef idx="2">
+            <a:schemeClr val="accent3"/>
+          </a:fillRef>
+          <a:effectRef idx="1">
+            <a:schemeClr val="accent3"/>
+          </a:effectRef>
+          <a:fontRef idx="minor">
+            <a:schemeClr val="dk1"/>
+          </a:fontRef>
+        </p:style>
+        <p:txBody>
+          <a:bodyPr rtlCol="0" anchor="ctr"/>
+          <a:lstStyle/>
+          <a:p>
+            <a:pPr algn="ctr"/>
+            <a:r>
+              <a:rPr lang="en-US" sz="1200" dirty="0" smtClean="0">
+                <a:latin typeface="+mj-lt"/>
+              </a:rPr>
+              <a:t>Commit to Final </a:t>
+            </a:r>
+          </a:p>
+          <a:p>
+            <a:pPr algn="ctr"/>
+            <a:r>
+              <a:rPr lang="en-US" sz="1200" dirty="0" smtClean="0">
+                <a:latin typeface="+mj-lt"/>
+              </a:rPr>
+              <a:t>Migration Script</a:t>
+            </a:r>
+            <a:endParaRPr lang="en-US" sz="1200" dirty="0">
+              <a:latin typeface="+mj-lt"/>
+            </a:endParaRPr>
+          </a:p>
+        </p:txBody>
+      </p:sp>
+      <p:cxnSp>
+        <p:nvCxnSpPr>
+          <p:cNvPr id="56" name="Elbow Connector 55"/>
+          <p:cNvCxnSpPr>
+            <a:stCxn id="48" idx="2"/>
+            <a:endCxn id="54" idx="3"/>
+          </p:cNvCxnSpPr>
+          <p:nvPr/>
+        </p:nvCxnSpPr>
+        <p:spPr>
+          <a:xfrm rot="5400000">
+            <a:off x="4478246" y="2928394"/>
+            <a:ext cx="644709" cy="4876800"/>
+          </a:xfrm>
+          <a:prstGeom prst="bentConnector2">
+            <a:avLst/>
+          </a:prstGeom>
+          <a:ln w="19050">
+            <a:tailEnd type="arrow"/>
+          </a:ln>
+        </p:spPr>
+        <p:style>
+          <a:lnRef idx="1">
+            <a:schemeClr val="accent1"/>
+          </a:lnRef>
+          <a:fillRef idx="0">
+            <a:schemeClr val="accent1"/>
+          </a:fillRef>
+          <a:effectRef idx="0">
+            <a:schemeClr val="accent1"/>
+          </a:effectRef>
+          <a:fontRef idx="minor">
+            <a:schemeClr val="tx1"/>
+          </a:fontRef>
+        </p:style>
+      </p:cxnSp>
+      <p:sp>
+        <p:nvSpPr>
+          <p:cNvPr id="57" name="TextBox 56"/>
+          <p:cNvSpPr txBox="1"/>
+          <p:nvPr/>
+        </p:nvSpPr>
+        <p:spPr>
+          <a:xfrm>
+            <a:off x="6895636" y="5029200"/>
+            <a:ext cx="343364" cy="261610"/>
+          </a:xfrm>
+          <a:prstGeom prst="rect">
+            <a:avLst/>
+          </a:prstGeom>
+          <a:noFill/>
+        </p:spPr>
+        <p:txBody>
+          <a:bodyPr wrap="none" rtlCol="0">
+            <a:spAutoFit/>
+          </a:bodyPr>
+          <a:lstStyle/>
+          <a:p>
+            <a:r>
+              <a:rPr lang="en-US" sz="1100" dirty="0" smtClean="0">
+                <a:latin typeface="+mj-lt"/>
+              </a:rPr>
+              <a:t>no</a:t>
+            </a:r>
+            <a:endParaRPr lang="en-US" sz="1100" dirty="0">
+              <a:latin typeface="+mj-lt"/>
+            </a:endParaRPr>
+          </a:p>
+        </p:txBody>
+      </p:sp>
+      <p:sp>
+        <p:nvSpPr>
+          <p:cNvPr id="58" name="Oval 57"/>
+          <p:cNvSpPr/>
+          <p:nvPr/>
+        </p:nvSpPr>
+        <p:spPr>
+          <a:xfrm>
+            <a:off x="1200150" y="6172200"/>
+            <a:ext cx="685800" cy="381000"/>
+          </a:xfrm>
+          <a:prstGeom prst="ellipse">
+            <a:avLst/>
+          </a:prstGeom>
+        </p:spPr>
+        <p:style>
+          <a:lnRef idx="1">
+            <a:schemeClr val="accent3"/>
+          </a:lnRef>
+          <a:fillRef idx="2">
+            <a:schemeClr val="accent3"/>
+          </a:fillRef>
+          <a:effectRef idx="1">
+            <a:schemeClr val="accent3"/>
+          </a:effectRef>
+          <a:fontRef idx="minor">
+            <a:schemeClr val="dk1"/>
+          </a:fontRef>
+        </p:style>
+        <p:txBody>
+          <a:bodyPr rtlCol="0" anchor="ctr"/>
+          <a:lstStyle/>
+          <a:p>
+            <a:pPr algn="ctr"/>
+            <a:r>
+              <a:rPr lang="en-US" sz="1050" dirty="0" smtClean="0">
+                <a:latin typeface="+mj-lt"/>
+              </a:rPr>
+              <a:t>end</a:t>
+            </a:r>
+            <a:endParaRPr lang="en-US" sz="1050" dirty="0">
+              <a:latin typeface="+mj-lt"/>
+            </a:endParaRPr>
+          </a:p>
+        </p:txBody>
+      </p:sp>
+      <p:cxnSp>
+        <p:nvCxnSpPr>
+          <p:cNvPr id="60" name="Straight Arrow Connector 59"/>
+          <p:cNvCxnSpPr>
+            <a:stCxn id="54" idx="2"/>
+            <a:endCxn id="58" idx="0"/>
+          </p:cNvCxnSpPr>
+          <p:nvPr/>
+        </p:nvCxnSpPr>
+        <p:spPr>
+          <a:xfrm>
+            <a:off x="1543050" y="5968097"/>
+            <a:ext cx="0" cy="204103"/>
+          </a:xfrm>
+          <a:prstGeom prst="straightConnector1">
+            <a:avLst/>
+          </a:prstGeom>
+          <a:ln w="19050">
+            <a:tailEnd type="arrow"/>
+          </a:ln>
+        </p:spPr>
+        <p:style>
+          <a:lnRef idx="1">
+            <a:schemeClr val="accent1"/>
+          </a:lnRef>
+          <a:fillRef idx="0">
+            <a:schemeClr val="accent1"/>
+          </a:fillRef>
+          <a:effectRef idx="0">
+            <a:schemeClr val="accent1"/>
+          </a:effectRef>
+          <a:fontRef idx="minor">
+            <a:schemeClr val="tx1"/>
+          </a:fontRef>
+        </p:style>
+      </p:cxnSp>
+      <p:sp>
+        <p:nvSpPr>
+          <p:cNvPr id="63" name="Oval 62"/>
+          <p:cNvSpPr/>
+          <p:nvPr/>
+        </p:nvSpPr>
+        <p:spPr>
+          <a:xfrm>
+            <a:off x="1219200" y="2438400"/>
+            <a:ext cx="685800" cy="381000"/>
+          </a:xfrm>
+          <a:prstGeom prst="ellipse">
+            <a:avLst/>
+          </a:prstGeom>
+        </p:spPr>
+        <p:style>
+          <a:lnRef idx="1">
+            <a:schemeClr val="accent3"/>
+          </a:lnRef>
+          <a:fillRef idx="2">
+            <a:schemeClr val="accent3"/>
+          </a:fillRef>
+          <a:effectRef idx="1">
+            <a:schemeClr val="accent3"/>
+          </a:effectRef>
+          <a:fontRef idx="minor">
+            <a:schemeClr val="dk1"/>
+          </a:fontRef>
+        </p:style>
+        <p:txBody>
+          <a:bodyPr rtlCol="0" anchor="ctr"/>
+          <a:lstStyle/>
+          <a:p>
+            <a:pPr algn="ctr"/>
+            <a:r>
+              <a:rPr lang="en-US" sz="1050" dirty="0" smtClean="0">
+                <a:latin typeface="+mj-lt"/>
+              </a:rPr>
+              <a:t>start</a:t>
+            </a:r>
+            <a:endParaRPr lang="en-US" sz="1050" dirty="0">
+              <a:latin typeface="+mj-lt"/>
+            </a:endParaRPr>
+          </a:p>
+        </p:txBody>
+      </p:sp>
+      <p:cxnSp>
+        <p:nvCxnSpPr>
+          <p:cNvPr id="65" name="Straight Arrow Connector 64"/>
+          <p:cNvCxnSpPr>
+            <a:stCxn id="63" idx="4"/>
+            <a:endCxn id="11" idx="0"/>
+          </p:cNvCxnSpPr>
+          <p:nvPr/>
+        </p:nvCxnSpPr>
+        <p:spPr>
+          <a:xfrm>
+            <a:off x="1562100" y="2819400"/>
+            <a:ext cx="0" cy="228600"/>
+          </a:xfrm>
+          <a:prstGeom prst="straightConnector1">
+            <a:avLst/>
+          </a:prstGeom>
+          <a:ln w="19050">
+            <a:tailEnd type="arrow"/>
+          </a:ln>
+        </p:spPr>
+        <p:style>
+          <a:lnRef idx="1">
+            <a:schemeClr val="accent1"/>
+          </a:lnRef>
+          <a:fillRef idx="0">
+            <a:schemeClr val="accent1"/>
+          </a:fillRef>
+          <a:effectRef idx="0">
+            <a:schemeClr val="accent1"/>
+          </a:effectRef>
+          <a:fontRef idx="minor">
+            <a:schemeClr val="tx1"/>
+          </a:fontRef>
+        </p:style>
+      </p:cxnSp>
     </p:spTree>
     <p:extLst>
       <p:ext uri="{BB962C8B-B14F-4D97-AF65-F5344CB8AC3E}">
-        <p14:creationId xmlns:p14="http://schemas.microsoft.com/office/powerpoint/2010/main" val="1429257599"/>
+        <p14:creationId xmlns:p14="http://schemas.microsoft.com/office/powerpoint/2010/main" val="2175594626"/>
       </p:ext>
     </p:extLst>
   </p:cSld>
@@ -4190,6 +5302,173 @@
       </p:sp>
       <p:sp>
         <p:nvSpPr>
+          <p:cNvPr id="5" name="Text Placeholder 4"/>
+          <p:cNvSpPr>
+            <a:spLocks noGrp="1"/>
+          </p:cNvSpPr>
+          <p:nvPr>
+            <p:ph type="body" idx="1"/>
+          </p:nvPr>
+        </p:nvSpPr>
+        <p:spPr/>
+        <p:txBody>
+          <a:bodyPr/>
+          <a:lstStyle/>
+          <a:p>
+            <a:endParaRPr lang="en-US"/>
+          </a:p>
+        </p:txBody>
+      </p:sp>
+    </p:spTree>
+    <p:extLst>
+      <p:ext uri="{BB962C8B-B14F-4D97-AF65-F5344CB8AC3E}">
+        <p14:creationId xmlns:p14="http://schemas.microsoft.com/office/powerpoint/2010/main" val="1803987864"/>
+      </p:ext>
+    </p:extLst>
+  </p:cSld>
+  <p:clrMapOvr>
+    <a:masterClrMapping/>
+  </p:clrMapOvr>
+</p:sld>
+</file>
+
+<file path=ppt/slides/slide13.xml><?xml version="1.0" encoding="utf-8"?>
+<p:sld xmlns:a="http://schemas.openxmlformats.org/drawingml/2006/main" xmlns:r="http://schemas.openxmlformats.org/officeDocument/2006/relationships" xmlns:p="http://schemas.openxmlformats.org/presentationml/2006/main">
+  <p:cSld>
+    <p:spTree>
+      <p:nvGrpSpPr>
+        <p:cNvPr id="1" name=""/>
+        <p:cNvGrpSpPr/>
+        <p:nvPr/>
+      </p:nvGrpSpPr>
+      <p:grpSpPr>
+        <a:xfrm>
+          <a:off x="0" y="0"/>
+          <a:ext cx="0" cy="0"/>
+          <a:chOff x="0" y="0"/>
+          <a:chExt cx="0" cy="0"/>
+        </a:xfrm>
+      </p:grpSpPr>
+      <p:sp>
+        <p:nvSpPr>
+          <p:cNvPr id="4" name="Title 3"/>
+          <p:cNvSpPr>
+            <a:spLocks noGrp="1"/>
+          </p:cNvSpPr>
+          <p:nvPr>
+            <p:ph type="title"/>
+          </p:nvPr>
+        </p:nvSpPr>
+        <p:spPr/>
+        <p:txBody>
+          <a:bodyPr/>
+          <a:lstStyle/>
+          <a:p>
+            <a:r>
+              <a:rPr lang="en-US" dirty="0" smtClean="0"/>
+              <a:t>Organization</a:t>
+            </a:r>
+            <a:endParaRPr lang="en-US" dirty="0"/>
+          </a:p>
+        </p:txBody>
+      </p:sp>
+      <p:sp>
+        <p:nvSpPr>
+          <p:cNvPr id="5" name="Content Placeholder 4"/>
+          <p:cNvSpPr>
+            <a:spLocks noGrp="1"/>
+          </p:cNvSpPr>
+          <p:nvPr>
+            <p:ph idx="1"/>
+          </p:nvPr>
+        </p:nvSpPr>
+        <p:spPr/>
+        <p:txBody>
+          <a:bodyPr/>
+          <a:lstStyle/>
+          <a:p>
+            <a:r>
+              <a:rPr lang="en-US" dirty="0" err="1" smtClean="0"/>
+              <a:t>Sys_Org</a:t>
+            </a:r>
+            <a:endParaRPr lang="en-US" dirty="0" smtClean="0"/>
+          </a:p>
+          <a:p>
+            <a:r>
+              <a:rPr lang="en-US" dirty="0" smtClean="0"/>
+              <a:t>Province</a:t>
+            </a:r>
+          </a:p>
+          <a:p>
+            <a:r>
+              <a:rPr lang="en-US" dirty="0" smtClean="0"/>
+              <a:t>Municipality</a:t>
+            </a:r>
+          </a:p>
+          <a:p>
+            <a:r>
+              <a:rPr lang="en-US" dirty="0" smtClean="0"/>
+              <a:t>Barangay</a:t>
+            </a:r>
+            <a:endParaRPr lang="en-US" dirty="0"/>
+          </a:p>
+        </p:txBody>
+      </p:sp>
+    </p:spTree>
+    <p:extLst>
+      <p:ext uri="{BB962C8B-B14F-4D97-AF65-F5344CB8AC3E}">
+        <p14:creationId xmlns:p14="http://schemas.microsoft.com/office/powerpoint/2010/main" val="1429257599"/>
+      </p:ext>
+    </p:extLst>
+  </p:cSld>
+  <p:clrMapOvr>
+    <a:masterClrMapping/>
+  </p:clrMapOvr>
+</p:sld>
+</file>
+
+<file path=ppt/slides/slide14.xml><?xml version="1.0" encoding="utf-8"?>
+<p:sld xmlns:a="http://schemas.openxmlformats.org/drawingml/2006/main" xmlns:r="http://schemas.openxmlformats.org/officeDocument/2006/relationships" xmlns:p="http://schemas.openxmlformats.org/presentationml/2006/main">
+  <p:cSld>
+    <p:spTree>
+      <p:nvGrpSpPr>
+        <p:cNvPr id="1" name=""/>
+        <p:cNvGrpSpPr/>
+        <p:nvPr/>
+      </p:nvGrpSpPr>
+      <p:grpSpPr>
+        <a:xfrm>
+          <a:off x="0" y="0"/>
+          <a:ext cx="0" cy="0"/>
+          <a:chOff x="0" y="0"/>
+          <a:chExt cx="0" cy="0"/>
+        </a:xfrm>
+      </p:grpSpPr>
+      <p:sp>
+        <p:nvSpPr>
+          <p:cNvPr id="4" name="Title 3"/>
+          <p:cNvSpPr>
+            <a:spLocks noGrp="1"/>
+          </p:cNvSpPr>
+          <p:nvPr>
+            <p:ph type="title"/>
+          </p:nvPr>
+        </p:nvSpPr>
+        <p:spPr/>
+        <p:txBody>
+          <a:bodyPr/>
+          <a:lstStyle/>
+          <a:p>
+            <a:r>
+              <a:rPr lang="en-US" dirty="0" smtClean="0"/>
+              <a:t>Organization</a:t>
+            </a:r>
+            <a:endParaRPr lang="en-US" dirty="0"/>
+          </a:p>
+        </p:txBody>
+      </p:sp>
+      <p:sp>
+        <p:nvSpPr>
           <p:cNvPr id="5" name="Content Placeholder 4"/>
           <p:cNvSpPr>
             <a:spLocks noGrp="1"/>
@@ -4237,7 +5516,6 @@
               <a:rPr lang="en-US" dirty="0" smtClean="0"/>
               <a:t>Tables used by RPT System</a:t>
             </a:r>
-            <a:endParaRPr lang="en-US" dirty="0" smtClean="0"/>
           </a:p>
           <a:p>
             <a:pPr lvl="1"/>
@@ -4256,7 +5534,6 @@
               <a:rPr lang="en-US" dirty="0" smtClean="0"/>
               <a:t>Province</a:t>
             </a:r>
-            <a:endParaRPr lang="en-US" dirty="0" smtClean="0"/>
           </a:p>
           <a:p>
             <a:pPr lvl="1"/>
@@ -4288,7 +5565,7 @@
 </p:sld>
 </file>
 
-<file path=ppt/slides/slide13.xml><?xml version="1.0" encoding="utf-8"?>
+<file path=ppt/slides/slide15.xml><?xml version="1.0" encoding="utf-8"?>
 <p:sld xmlns:a="http://schemas.openxmlformats.org/drawingml/2006/main" xmlns:r="http://schemas.openxmlformats.org/officeDocument/2006/relationships" xmlns:p="http://schemas.openxmlformats.org/presentationml/2006/main">
   <p:cSld>
     <p:spTree>
@@ -4617,216 +5894,6 @@
 </p:sld>
 </file>
 
-<file path=ppt/slides/slide14.xml><?xml version="1.0" encoding="utf-8"?>
-<p:sld xmlns:a="http://schemas.openxmlformats.org/drawingml/2006/main" xmlns:r="http://schemas.openxmlformats.org/officeDocument/2006/relationships" xmlns:p="http://schemas.openxmlformats.org/presentationml/2006/main">
-  <p:cSld>
-    <p:spTree>
-      <p:nvGrpSpPr>
-        <p:cNvPr id="1" name=""/>
-        <p:cNvGrpSpPr/>
-        <p:nvPr/>
-      </p:nvGrpSpPr>
-      <p:grpSpPr>
-        <a:xfrm>
-          <a:off x="0" y="0"/>
-          <a:ext cx="0" cy="0"/>
-          <a:chOff x="0" y="0"/>
-          <a:chExt cx="0" cy="0"/>
-        </a:xfrm>
-      </p:grpSpPr>
-      <p:sp>
-        <p:nvSpPr>
-          <p:cNvPr id="4" name="Title 3"/>
-          <p:cNvSpPr>
-            <a:spLocks noGrp="1"/>
-          </p:cNvSpPr>
-          <p:nvPr>
-            <p:ph type="title"/>
-          </p:nvPr>
-        </p:nvSpPr>
-        <p:spPr/>
-        <p:txBody>
-          <a:bodyPr/>
-          <a:lstStyle/>
-          <a:p>
-            <a:r>
-              <a:rPr lang="en-US" dirty="0" smtClean="0"/>
-              <a:t>Master Data Migration</a:t>
-            </a:r>
-            <a:endParaRPr lang="en-US" dirty="0"/>
-          </a:p>
-        </p:txBody>
-      </p:sp>
-      <p:sp>
-        <p:nvSpPr>
-          <p:cNvPr id="5" name="Text Placeholder 4"/>
-          <p:cNvSpPr>
-            <a:spLocks noGrp="1"/>
-          </p:cNvSpPr>
-          <p:nvPr>
-            <p:ph type="body" idx="1"/>
-          </p:nvPr>
-        </p:nvSpPr>
-        <p:spPr/>
-        <p:txBody>
-          <a:bodyPr/>
-          <a:lstStyle/>
-          <a:p>
-            <a:endParaRPr lang="en-US"/>
-          </a:p>
-        </p:txBody>
-      </p:sp>
-    </p:spTree>
-    <p:extLst>
-      <p:ext uri="{BB962C8B-B14F-4D97-AF65-F5344CB8AC3E}">
-        <p14:creationId xmlns:p14="http://schemas.microsoft.com/office/powerpoint/2010/main" val="3997040072"/>
-      </p:ext>
-    </p:extLst>
-  </p:cSld>
-  <p:clrMapOvr>
-    <a:masterClrMapping/>
-  </p:clrMapOvr>
-</p:sld>
-</file>
-
-<file path=ppt/slides/slide15.xml><?xml version="1.0" encoding="utf-8"?>
-<p:sld xmlns:a="http://schemas.openxmlformats.org/drawingml/2006/main" xmlns:r="http://schemas.openxmlformats.org/officeDocument/2006/relationships" xmlns:p="http://schemas.openxmlformats.org/presentationml/2006/main">
-  <p:cSld>
-    <p:spTree>
-      <p:nvGrpSpPr>
-        <p:cNvPr id="1" name=""/>
-        <p:cNvGrpSpPr/>
-        <p:nvPr/>
-      </p:nvGrpSpPr>
-      <p:grpSpPr>
-        <a:xfrm>
-          <a:off x="0" y="0"/>
-          <a:ext cx="0" cy="0"/>
-          <a:chOff x="0" y="0"/>
-          <a:chExt cx="0" cy="0"/>
-        </a:xfrm>
-      </p:grpSpPr>
-      <p:sp>
-        <p:nvSpPr>
-          <p:cNvPr id="4" name="Title 3"/>
-          <p:cNvSpPr>
-            <a:spLocks noGrp="1"/>
-          </p:cNvSpPr>
-          <p:nvPr>
-            <p:ph type="title"/>
-          </p:nvPr>
-        </p:nvSpPr>
-        <p:spPr/>
-        <p:txBody>
-          <a:bodyPr/>
-          <a:lstStyle/>
-          <a:p>
-            <a:r>
-              <a:rPr lang="en-US" dirty="0" smtClean="0"/>
-              <a:t>Master Files</a:t>
-            </a:r>
-            <a:endParaRPr lang="en-US" dirty="0"/>
-          </a:p>
-        </p:txBody>
-      </p:sp>
-      <p:sp>
-        <p:nvSpPr>
-          <p:cNvPr id="5" name="Content Placeholder 4"/>
-          <p:cNvSpPr>
-            <a:spLocks noGrp="1"/>
-          </p:cNvSpPr>
-          <p:nvPr>
-            <p:ph idx="1"/>
-          </p:nvPr>
-        </p:nvSpPr>
-        <p:spPr/>
-        <p:txBody>
-          <a:bodyPr>
-            <a:normAutofit fontScale="92500" lnSpcReduction="20000"/>
-          </a:bodyPr>
-          <a:lstStyle/>
-          <a:p>
-            <a:r>
-              <a:rPr lang="en-PH" dirty="0"/>
-              <a:t>Property Classification</a:t>
-            </a:r>
-          </a:p>
-          <a:p>
-            <a:r>
-              <a:rPr lang="en-PH" dirty="0"/>
-              <a:t>Exemption Type</a:t>
-            </a:r>
-          </a:p>
-          <a:p>
-            <a:r>
-              <a:rPr lang="en-PH" dirty="0"/>
-              <a:t>Land Specific Classes</a:t>
-            </a:r>
-          </a:p>
-          <a:p>
-            <a:r>
-              <a:rPr lang="en-PH" dirty="0"/>
-              <a:t>Cancel TD Reason</a:t>
-            </a:r>
-          </a:p>
-          <a:p>
-            <a:r>
-              <a:rPr lang="en-PH" dirty="0"/>
-              <a:t>Kind of Building</a:t>
-            </a:r>
-          </a:p>
-          <a:p>
-            <a:r>
-              <a:rPr lang="en-PH" dirty="0"/>
-              <a:t>Material</a:t>
-            </a:r>
-          </a:p>
-          <a:p>
-            <a:r>
-              <a:rPr lang="en-PH" dirty="0"/>
-              <a:t>Structure</a:t>
-            </a:r>
-          </a:p>
-          <a:p>
-            <a:r>
-              <a:rPr lang="en-PH" dirty="0"/>
-              <a:t>Machine</a:t>
-            </a:r>
-          </a:p>
-          <a:p>
-            <a:r>
-              <a:rPr lang="en-PH" dirty="0"/>
-              <a:t>Plant and Tree</a:t>
-            </a:r>
-          </a:p>
-          <a:p>
-            <a:r>
-              <a:rPr lang="en-PH" dirty="0"/>
-              <a:t>Miscellaneous Properties</a:t>
-            </a:r>
-          </a:p>
-          <a:p>
-            <a:r>
-              <a:rPr lang="en-PH" dirty="0" smtClean="0"/>
-              <a:t>Parameter</a:t>
-            </a:r>
-            <a:endParaRPr lang="en-PH" dirty="0"/>
-          </a:p>
-        </p:txBody>
-      </p:sp>
-    </p:spTree>
-    <p:extLst>
-      <p:ext uri="{BB962C8B-B14F-4D97-AF65-F5344CB8AC3E}">
-        <p14:creationId xmlns:p14="http://schemas.microsoft.com/office/powerpoint/2010/main" val="1720850424"/>
-      </p:ext>
-    </p:extLst>
-  </p:cSld>
-  <p:clrMapOvr>
-    <a:masterClrMapping/>
-  </p:clrMapOvr>
-</p:sld>
-</file>
-
 <file path=ppt/slides/slide16.xml><?xml version="1.0" encoding="utf-8"?>
 <p:sld xmlns:a="http://schemas.openxmlformats.org/drawingml/2006/main" xmlns:r="http://schemas.openxmlformats.org/officeDocument/2006/relationships" xmlns:p="http://schemas.openxmlformats.org/presentationml/2006/main">
   <p:cSld>
@@ -4861,7 +5928,7 @@
           <a:p>
             <a:r>
               <a:rPr lang="en-US" dirty="0" smtClean="0"/>
-              <a:t>Revision Setting</a:t>
+              <a:t>Master Data Migration</a:t>
             </a:r>
             <a:endParaRPr lang="en-US" dirty="0"/>
           </a:p>
@@ -4889,7 +5956,7 @@
     </p:spTree>
     <p:extLst>
       <p:ext uri="{BB962C8B-B14F-4D97-AF65-F5344CB8AC3E}">
-        <p14:creationId xmlns:p14="http://schemas.microsoft.com/office/powerpoint/2010/main" val="870794749"/>
+        <p14:creationId xmlns:p14="http://schemas.microsoft.com/office/powerpoint/2010/main" val="3997040072"/>
       </p:ext>
     </p:extLst>
   </p:cSld>
@@ -4918,7 +5985,7 @@
       </p:grpSpPr>
       <p:sp>
         <p:nvSpPr>
-          <p:cNvPr id="2" name="Title 1"/>
+          <p:cNvPr id="4" name="Title 3"/>
           <p:cNvSpPr>
             <a:spLocks noGrp="1"/>
           </p:cNvSpPr>
@@ -4933,7 +6000,7 @@
           <a:p>
             <a:r>
               <a:rPr lang="en-US" dirty="0" smtClean="0"/>
-              <a:t>Land Revision Settings</a:t>
+              <a:t>Master Files</a:t>
             </a:r>
             <a:endParaRPr lang="en-US" dirty="0"/>
           </a:p>
@@ -4941,7 +6008,7 @@
       </p:sp>
       <p:sp>
         <p:nvSpPr>
-          <p:cNvPr id="3" name="Content Placeholder 2"/>
+          <p:cNvPr id="5" name="Content Placeholder 4"/>
           <p:cNvSpPr>
             <a:spLocks noGrp="1"/>
           </p:cNvSpPr>
@@ -4951,51 +6018,83 @@
         </p:nvSpPr>
         <p:spPr/>
         <p:txBody>
-          <a:bodyPr/>
-          <a:lstStyle/>
-          <a:p>
-            <a:r>
-              <a:rPr lang="en-US" dirty="0" smtClean="0"/>
-              <a:t>Revision Setting</a:t>
-            </a:r>
-          </a:p>
-          <a:p>
-            <a:r>
-              <a:rPr lang="en-US" dirty="0" smtClean="0"/>
-              <a:t>Assess Levels</a:t>
-            </a:r>
-          </a:p>
-          <a:p>
-            <a:r>
-              <a:rPr lang="en-US" dirty="0" smtClean="0"/>
-              <a:t>Specific Classes</a:t>
-            </a:r>
-          </a:p>
-          <a:p>
-            <a:r>
-              <a:rPr lang="en-US" dirty="0" smtClean="0"/>
-              <a:t>Subclasses</a:t>
-            </a:r>
-          </a:p>
-          <a:p>
-            <a:r>
-              <a:rPr lang="en-US" dirty="0" smtClean="0"/>
-              <a:t>Stripping</a:t>
-            </a:r>
-          </a:p>
-          <a:p>
-            <a:r>
-              <a:rPr lang="en-US" dirty="0" smtClean="0"/>
-              <a:t>Adjustments</a:t>
-            </a:r>
-            <a:endParaRPr lang="en-US" dirty="0"/>
+          <a:bodyPr>
+            <a:normAutofit fontScale="92500" lnSpcReduction="20000"/>
+          </a:bodyPr>
+          <a:lstStyle/>
+          <a:p>
+            <a:r>
+              <a:rPr lang="en-PH" dirty="0"/>
+              <a:t>Property Classification</a:t>
+            </a:r>
+          </a:p>
+          <a:p>
+            <a:r>
+              <a:rPr lang="en-PH" dirty="0"/>
+              <a:t>Exemption Type</a:t>
+            </a:r>
+          </a:p>
+          <a:p>
+            <a:r>
+              <a:rPr lang="en-PH" dirty="0"/>
+              <a:t>Land Specific Classes</a:t>
+            </a:r>
+          </a:p>
+          <a:p>
+            <a:r>
+              <a:rPr lang="en-PH" dirty="0"/>
+              <a:t>Cancel TD Reason</a:t>
+            </a:r>
+          </a:p>
+          <a:p>
+            <a:r>
+              <a:rPr lang="en-PH" dirty="0"/>
+              <a:t>Kind of Building</a:t>
+            </a:r>
+          </a:p>
+          <a:p>
+            <a:r>
+              <a:rPr lang="en-PH" dirty="0"/>
+              <a:t>Material</a:t>
+            </a:r>
+          </a:p>
+          <a:p>
+            <a:r>
+              <a:rPr lang="en-PH" dirty="0"/>
+              <a:t>Structure</a:t>
+            </a:r>
+          </a:p>
+          <a:p>
+            <a:r>
+              <a:rPr lang="en-PH" dirty="0"/>
+              <a:t>Machine</a:t>
+            </a:r>
+          </a:p>
+          <a:p>
+            <a:r>
+              <a:rPr lang="en-PH" dirty="0"/>
+              <a:t>Plant and Tree</a:t>
+            </a:r>
+          </a:p>
+          <a:p>
+            <a:r>
+              <a:rPr lang="en-PH" dirty="0"/>
+              <a:t>Miscellaneous Properties</a:t>
+            </a:r>
+          </a:p>
+          <a:p>
+            <a:r>
+              <a:rPr lang="en-PH" dirty="0" smtClean="0"/>
+              <a:t>Parameter</a:t>
+            </a:r>
+            <a:endParaRPr lang="en-PH" dirty="0"/>
           </a:p>
         </p:txBody>
       </p:sp>
     </p:spTree>
     <p:extLst>
       <p:ext uri="{BB962C8B-B14F-4D97-AF65-F5344CB8AC3E}">
-        <p14:creationId xmlns:p14="http://schemas.microsoft.com/office/powerpoint/2010/main" val="2507475010"/>
+        <p14:creationId xmlns:p14="http://schemas.microsoft.com/office/powerpoint/2010/main" val="1720850424"/>
       </p:ext>
     </p:extLst>
   </p:cSld>
@@ -5024,7 +6123,7 @@
       </p:grpSpPr>
       <p:sp>
         <p:nvSpPr>
-          <p:cNvPr id="2" name="Title 1"/>
+          <p:cNvPr id="4" name="Title 3"/>
           <p:cNvSpPr>
             <a:spLocks noGrp="1"/>
           </p:cNvSpPr>
@@ -5039,7 +6138,7 @@
           <a:p>
             <a:r>
               <a:rPr lang="en-US" dirty="0" smtClean="0"/>
-              <a:t>Building Revision Settings</a:t>
+              <a:t>Revision Setting</a:t>
             </a:r>
             <a:endParaRPr lang="en-US" dirty="0"/>
           </a:p>
@@ -5047,12 +6146,12 @@
       </p:sp>
       <p:sp>
         <p:nvSpPr>
-          <p:cNvPr id="3" name="Content Placeholder 2"/>
-          <p:cNvSpPr>
-            <a:spLocks noGrp="1"/>
-          </p:cNvSpPr>
-          <p:nvPr>
-            <p:ph idx="1"/>
+          <p:cNvPr id="5" name="Text Placeholder 4"/>
+          <p:cNvSpPr>
+            <a:spLocks noGrp="1"/>
+          </p:cNvSpPr>
+          <p:nvPr>
+            <p:ph type="body" idx="1"/>
           </p:nvPr>
         </p:nvSpPr>
         <p:spPr/>
@@ -5060,64 +6159,14 @@
           <a:bodyPr/>
           <a:lstStyle/>
           <a:p>
-            <a:r>
-              <a:rPr lang="en-US" dirty="0" smtClean="0"/>
-              <a:t>Revision Setting</a:t>
-            </a:r>
-          </a:p>
-          <a:p>
-            <a:r>
-              <a:rPr lang="en-US" dirty="0" smtClean="0"/>
-              <a:t>Assess Levels</a:t>
-            </a:r>
-          </a:p>
-          <a:p>
-            <a:r>
-              <a:rPr lang="en-US" dirty="0" smtClean="0"/>
-              <a:t>Building Types</a:t>
-            </a:r>
-          </a:p>
-          <a:p>
-            <a:r>
-              <a:rPr lang="en-US" dirty="0" smtClean="0"/>
-              <a:t>Building Unit Construction Costs</a:t>
-            </a:r>
-          </a:p>
-          <a:p>
-            <a:r>
-              <a:rPr lang="en-US" dirty="0" smtClean="0"/>
-              <a:t>Building Type Depreciations</a:t>
-            </a:r>
-          </a:p>
-          <a:p>
-            <a:r>
-              <a:rPr lang="en-US" dirty="0" smtClean="0"/>
-              <a:t>Building Type Multi-</a:t>
-            </a:r>
-            <a:r>
-              <a:rPr lang="en-US" dirty="0" err="1" smtClean="0"/>
-              <a:t>Storey</a:t>
-            </a:r>
-            <a:r>
-              <a:rPr lang="en-US" dirty="0" smtClean="0"/>
-              <a:t> Adjustments</a:t>
-            </a:r>
-          </a:p>
-          <a:p>
-            <a:r>
-              <a:rPr lang="en-US" dirty="0" smtClean="0"/>
-              <a:t>Additional Items and Adjustments</a:t>
-            </a:r>
-          </a:p>
-          <a:p>
-            <a:endParaRPr lang="en-US" dirty="0"/>
+            <a:endParaRPr lang="en-US"/>
           </a:p>
         </p:txBody>
       </p:sp>
     </p:spTree>
     <p:extLst>
       <p:ext uri="{BB962C8B-B14F-4D97-AF65-F5344CB8AC3E}">
-        <p14:creationId xmlns:p14="http://schemas.microsoft.com/office/powerpoint/2010/main" val="4184613396"/>
+        <p14:creationId xmlns:p14="http://schemas.microsoft.com/office/powerpoint/2010/main" val="870794749"/>
       </p:ext>
     </p:extLst>
   </p:cSld>
@@ -5161,7 +6210,7 @@
           <a:p>
             <a:r>
               <a:rPr lang="en-US" dirty="0" smtClean="0"/>
-              <a:t>Machinery Revision Settings</a:t>
+              <a:t>Land Revision Settings</a:t>
             </a:r>
             <a:endParaRPr lang="en-US" dirty="0"/>
           </a:p>
@@ -5195,12 +6244,26 @@
           </a:p>
           <a:p>
             <a:r>
-              <a:rPr lang="en-US" dirty="0" err="1" smtClean="0"/>
-              <a:t>Forex</a:t>
-            </a:r>
-            <a:r>
-              <a:rPr lang="en-US" dirty="0" smtClean="0"/>
-              <a:t> Schedules</a:t>
+              <a:rPr lang="en-US" dirty="0" smtClean="0"/>
+              <a:t>Specific Classes</a:t>
+            </a:r>
+          </a:p>
+          <a:p>
+            <a:r>
+              <a:rPr lang="en-US" dirty="0" smtClean="0"/>
+              <a:t>Subclasses</a:t>
+            </a:r>
+          </a:p>
+          <a:p>
+            <a:r>
+              <a:rPr lang="en-US" dirty="0" smtClean="0"/>
+              <a:t>Stripping</a:t>
+            </a:r>
+          </a:p>
+          <a:p>
+            <a:r>
+              <a:rPr lang="en-US" dirty="0" smtClean="0"/>
+              <a:t>Adjustments</a:t>
             </a:r>
             <a:endParaRPr lang="en-US" dirty="0"/>
           </a:p>
@@ -5209,7 +6272,7 @@
     </p:spTree>
     <p:extLst>
       <p:ext uri="{BB962C8B-B14F-4D97-AF65-F5344CB8AC3E}">
-        <p14:creationId xmlns:p14="http://schemas.microsoft.com/office/powerpoint/2010/main" val="1444660344"/>
+        <p14:creationId xmlns:p14="http://schemas.microsoft.com/office/powerpoint/2010/main" val="2507475010"/>
       </p:ext>
     </p:extLst>
   </p:cSld>
@@ -5348,7 +6411,7 @@
           <a:p>
             <a:r>
               <a:rPr lang="en-US" dirty="0" smtClean="0"/>
-              <a:t>Plant/Tree Revision Settings</a:t>
+              <a:t>Building Revision Settings</a:t>
             </a:r>
             <a:endParaRPr lang="en-US" dirty="0"/>
           </a:p>
@@ -5377,15 +6440,56 @@
           <a:p>
             <a:r>
               <a:rPr lang="en-US" dirty="0" smtClean="0"/>
-              <a:t>Plant/Tree Unit Values</a:t>
-            </a:r>
+              <a:t>Assess Levels</a:t>
+            </a:r>
+          </a:p>
+          <a:p>
+            <a:r>
+              <a:rPr lang="en-US" dirty="0" smtClean="0"/>
+              <a:t>Building Types</a:t>
+            </a:r>
+          </a:p>
+          <a:p>
+            <a:r>
+              <a:rPr lang="en-US" dirty="0" smtClean="0"/>
+              <a:t>Building Unit Construction Costs</a:t>
+            </a:r>
+          </a:p>
+          <a:p>
+            <a:r>
+              <a:rPr lang="en-US" dirty="0" smtClean="0"/>
+              <a:t>Building Type Depreciations</a:t>
+            </a:r>
+          </a:p>
+          <a:p>
+            <a:r>
+              <a:rPr lang="en-US" dirty="0" smtClean="0"/>
+              <a:t>Building Type Multi-</a:t>
+            </a:r>
+            <a:r>
+              <a:rPr lang="en-US" dirty="0" err="1" smtClean="0"/>
+              <a:t>Storey</a:t>
+            </a:r>
+            <a:r>
+              <a:rPr lang="en-US" dirty="0" smtClean="0"/>
+              <a:t> Adjustments</a:t>
+            </a:r>
+          </a:p>
+          <a:p>
+            <a:r>
+              <a:rPr lang="en-US" dirty="0" smtClean="0"/>
+              <a:t>Additional Items and Adjustments</a:t>
+            </a:r>
+          </a:p>
+          <a:p>
+            <a:endParaRPr lang="en-US" dirty="0"/>
           </a:p>
         </p:txBody>
       </p:sp>
     </p:spTree>
     <p:extLst>
       <p:ext uri="{BB962C8B-B14F-4D97-AF65-F5344CB8AC3E}">
-        <p14:creationId xmlns:p14="http://schemas.microsoft.com/office/powerpoint/2010/main" val="3515085764"/>
+        <p14:creationId xmlns:p14="http://schemas.microsoft.com/office/powerpoint/2010/main" val="4184613396"/>
       </p:ext>
     </p:extLst>
   </p:cSld>
@@ -5429,7 +6533,7 @@
           <a:p>
             <a:r>
               <a:rPr lang="en-US" dirty="0" smtClean="0"/>
-              <a:t>Miscellaneous Revision Settings</a:t>
+              <a:t>Machinery Revision Settings</a:t>
             </a:r>
             <a:endParaRPr lang="en-US" dirty="0"/>
           </a:p>
@@ -5458,15 +6562,26 @@
           <a:p>
             <a:r>
               <a:rPr lang="en-US" dirty="0" smtClean="0"/>
-              <a:t>Miscellaneous Property Unit Values</a:t>
-            </a:r>
+              <a:t>Assess Levels</a:t>
+            </a:r>
+          </a:p>
+          <a:p>
+            <a:r>
+              <a:rPr lang="en-US" dirty="0" err="1" smtClean="0"/>
+              <a:t>Forex</a:t>
+            </a:r>
+            <a:r>
+              <a:rPr lang="en-US" dirty="0" smtClean="0"/>
+              <a:t> Schedules</a:t>
+            </a:r>
+            <a:endParaRPr lang="en-US" dirty="0"/>
           </a:p>
         </p:txBody>
       </p:sp>
     </p:spTree>
     <p:extLst>
       <p:ext uri="{BB962C8B-B14F-4D97-AF65-F5344CB8AC3E}">
-        <p14:creationId xmlns:p14="http://schemas.microsoft.com/office/powerpoint/2010/main" val="1393444395"/>
+        <p14:creationId xmlns:p14="http://schemas.microsoft.com/office/powerpoint/2010/main" val="1444660344"/>
       </p:ext>
     </p:extLst>
   </p:cSld>
@@ -5495,7 +6610,7 @@
       </p:grpSpPr>
       <p:sp>
         <p:nvSpPr>
-          <p:cNvPr id="4" name="Title 3"/>
+          <p:cNvPr id="2" name="Title 1"/>
           <p:cNvSpPr>
             <a:spLocks noGrp="1"/>
           </p:cNvSpPr>
@@ -5510,7 +6625,7 @@
           <a:p>
             <a:r>
               <a:rPr lang="en-US" dirty="0" smtClean="0"/>
-              <a:t>Entity</a:t>
+              <a:t>Plant/Tree Revision Settings</a:t>
             </a:r>
             <a:endParaRPr lang="en-US" dirty="0"/>
           </a:p>
@@ -5518,12 +6633,12 @@
       </p:sp>
       <p:sp>
         <p:nvSpPr>
-          <p:cNvPr id="5" name="Text Placeholder 4"/>
-          <p:cNvSpPr>
-            <a:spLocks noGrp="1"/>
-          </p:cNvSpPr>
-          <p:nvPr>
-            <p:ph type="body" idx="1"/>
+          <p:cNvPr id="3" name="Content Placeholder 2"/>
+          <p:cNvSpPr>
+            <a:spLocks noGrp="1"/>
+          </p:cNvSpPr>
+          <p:nvPr>
+            <p:ph idx="1"/>
           </p:nvPr>
         </p:nvSpPr>
         <p:spPr/>
@@ -5531,14 +6646,23 @@
           <a:bodyPr/>
           <a:lstStyle/>
           <a:p>
-            <a:endParaRPr lang="en-US"/>
+            <a:r>
+              <a:rPr lang="en-US" dirty="0" smtClean="0"/>
+              <a:t>Revision Setting</a:t>
+            </a:r>
+          </a:p>
+          <a:p>
+            <a:r>
+              <a:rPr lang="en-US" dirty="0" smtClean="0"/>
+              <a:t>Plant/Tree Unit Values</a:t>
+            </a:r>
           </a:p>
         </p:txBody>
       </p:sp>
     </p:spTree>
     <p:extLst>
       <p:ext uri="{BB962C8B-B14F-4D97-AF65-F5344CB8AC3E}">
-        <p14:creationId xmlns:p14="http://schemas.microsoft.com/office/powerpoint/2010/main" val="3458766247"/>
+        <p14:creationId xmlns:p14="http://schemas.microsoft.com/office/powerpoint/2010/main" val="3515085764"/>
       </p:ext>
     </p:extLst>
   </p:cSld>
@@ -5582,6 +6706,159 @@
           <a:p>
             <a:r>
               <a:rPr lang="en-US" dirty="0" smtClean="0"/>
+              <a:t>Miscellaneous Revision Settings</a:t>
+            </a:r>
+            <a:endParaRPr lang="en-US" dirty="0"/>
+          </a:p>
+        </p:txBody>
+      </p:sp>
+      <p:sp>
+        <p:nvSpPr>
+          <p:cNvPr id="3" name="Content Placeholder 2"/>
+          <p:cNvSpPr>
+            <a:spLocks noGrp="1"/>
+          </p:cNvSpPr>
+          <p:nvPr>
+            <p:ph idx="1"/>
+          </p:nvPr>
+        </p:nvSpPr>
+        <p:spPr/>
+        <p:txBody>
+          <a:bodyPr/>
+          <a:lstStyle/>
+          <a:p>
+            <a:r>
+              <a:rPr lang="en-US" dirty="0" smtClean="0"/>
+              <a:t>Revision Setting</a:t>
+            </a:r>
+          </a:p>
+          <a:p>
+            <a:r>
+              <a:rPr lang="en-US" dirty="0" smtClean="0"/>
+              <a:t>Miscellaneous Property Unit Values</a:t>
+            </a:r>
+          </a:p>
+        </p:txBody>
+      </p:sp>
+    </p:spTree>
+    <p:extLst>
+      <p:ext uri="{BB962C8B-B14F-4D97-AF65-F5344CB8AC3E}">
+        <p14:creationId xmlns:p14="http://schemas.microsoft.com/office/powerpoint/2010/main" val="1393444395"/>
+      </p:ext>
+    </p:extLst>
+  </p:cSld>
+  <p:clrMapOvr>
+    <a:masterClrMapping/>
+  </p:clrMapOvr>
+</p:sld>
+</file>
+
+<file path=ppt/slides/slide24.xml><?xml version="1.0" encoding="utf-8"?>
+<p:sld xmlns:a="http://schemas.openxmlformats.org/drawingml/2006/main" xmlns:r="http://schemas.openxmlformats.org/officeDocument/2006/relationships" xmlns:p="http://schemas.openxmlformats.org/presentationml/2006/main">
+  <p:cSld>
+    <p:spTree>
+      <p:nvGrpSpPr>
+        <p:cNvPr id="1" name=""/>
+        <p:cNvGrpSpPr/>
+        <p:nvPr/>
+      </p:nvGrpSpPr>
+      <p:grpSpPr>
+        <a:xfrm>
+          <a:off x="0" y="0"/>
+          <a:ext cx="0" cy="0"/>
+          <a:chOff x="0" y="0"/>
+          <a:chExt cx="0" cy="0"/>
+        </a:xfrm>
+      </p:grpSpPr>
+      <p:sp>
+        <p:nvSpPr>
+          <p:cNvPr id="4" name="Title 3"/>
+          <p:cNvSpPr>
+            <a:spLocks noGrp="1"/>
+          </p:cNvSpPr>
+          <p:nvPr>
+            <p:ph type="title"/>
+          </p:nvPr>
+        </p:nvSpPr>
+        <p:spPr/>
+        <p:txBody>
+          <a:bodyPr/>
+          <a:lstStyle/>
+          <a:p>
+            <a:r>
+              <a:rPr lang="en-US" dirty="0" smtClean="0"/>
+              <a:t>Entity</a:t>
+            </a:r>
+            <a:endParaRPr lang="en-US" dirty="0"/>
+          </a:p>
+        </p:txBody>
+      </p:sp>
+      <p:sp>
+        <p:nvSpPr>
+          <p:cNvPr id="5" name="Text Placeholder 4"/>
+          <p:cNvSpPr>
+            <a:spLocks noGrp="1"/>
+          </p:cNvSpPr>
+          <p:nvPr>
+            <p:ph type="body" idx="1"/>
+          </p:nvPr>
+        </p:nvSpPr>
+        <p:spPr/>
+        <p:txBody>
+          <a:bodyPr/>
+          <a:lstStyle/>
+          <a:p>
+            <a:endParaRPr lang="en-US"/>
+          </a:p>
+        </p:txBody>
+      </p:sp>
+    </p:spTree>
+    <p:extLst>
+      <p:ext uri="{BB962C8B-B14F-4D97-AF65-F5344CB8AC3E}">
+        <p14:creationId xmlns:p14="http://schemas.microsoft.com/office/powerpoint/2010/main" val="3458766247"/>
+      </p:ext>
+    </p:extLst>
+  </p:cSld>
+  <p:clrMapOvr>
+    <a:masterClrMapping/>
+  </p:clrMapOvr>
+</p:sld>
+</file>
+
+<file path=ppt/slides/slide25.xml><?xml version="1.0" encoding="utf-8"?>
+<p:sld xmlns:a="http://schemas.openxmlformats.org/drawingml/2006/main" xmlns:r="http://schemas.openxmlformats.org/officeDocument/2006/relationships" xmlns:p="http://schemas.openxmlformats.org/presentationml/2006/main">
+  <p:cSld>
+    <p:spTree>
+      <p:nvGrpSpPr>
+        <p:cNvPr id="1" name=""/>
+        <p:cNvGrpSpPr/>
+        <p:nvPr/>
+      </p:nvGrpSpPr>
+      <p:grpSpPr>
+        <a:xfrm>
+          <a:off x="0" y="0"/>
+          <a:ext cx="0" cy="0"/>
+          <a:chOff x="0" y="0"/>
+          <a:chExt cx="0" cy="0"/>
+        </a:xfrm>
+      </p:grpSpPr>
+      <p:sp>
+        <p:nvSpPr>
+          <p:cNvPr id="2" name="Title 1"/>
+          <p:cNvSpPr>
+            <a:spLocks noGrp="1"/>
+          </p:cNvSpPr>
+          <p:nvPr>
+            <p:ph type="title"/>
+          </p:nvPr>
+        </p:nvSpPr>
+        <p:spPr/>
+        <p:txBody>
+          <a:bodyPr/>
+          <a:lstStyle/>
+          <a:p>
+            <a:r>
+              <a:rPr lang="en-US" dirty="0" smtClean="0"/>
               <a:t>Entity</a:t>
             </a:r>
             <a:endParaRPr lang="en-US" dirty="0"/>
@@ -5647,7 +6924,7 @@
 </p:sld>
 </file>
 
-<file path=ppt/slides/slide24.xml><?xml version="1.0" encoding="utf-8"?>
+<file path=ppt/slides/slide26.xml><?xml version="1.0" encoding="utf-8"?>
 <p:sld xmlns:a="http://schemas.openxmlformats.org/drawingml/2006/main" xmlns:r="http://schemas.openxmlformats.org/officeDocument/2006/relationships" xmlns:p="http://schemas.openxmlformats.org/presentationml/2006/main">
   <p:cSld>
     <p:spTree>
@@ -6067,190 +7344,6 @@
 </p:sld>
 </file>
 
-<file path=ppt/slides/slide25.xml><?xml version="1.0" encoding="utf-8"?>
-<p:sld xmlns:a="http://schemas.openxmlformats.org/drawingml/2006/main" xmlns:r="http://schemas.openxmlformats.org/officeDocument/2006/relationships" xmlns:p="http://schemas.openxmlformats.org/presentationml/2006/main">
-  <p:cSld>
-    <p:spTree>
-      <p:nvGrpSpPr>
-        <p:cNvPr id="1" name=""/>
-        <p:cNvGrpSpPr/>
-        <p:nvPr/>
-      </p:nvGrpSpPr>
-      <p:grpSpPr>
-        <a:xfrm>
-          <a:off x="0" y="0"/>
-          <a:ext cx="0" cy="0"/>
-          <a:chOff x="0" y="0"/>
-          <a:chExt cx="0" cy="0"/>
-        </a:xfrm>
-      </p:grpSpPr>
-      <p:sp>
-        <p:nvSpPr>
-          <p:cNvPr id="4" name="Title 3"/>
-          <p:cNvSpPr>
-            <a:spLocks noGrp="1"/>
-          </p:cNvSpPr>
-          <p:nvPr>
-            <p:ph type="title"/>
-          </p:nvPr>
-        </p:nvSpPr>
-        <p:spPr/>
-        <p:txBody>
-          <a:bodyPr/>
-          <a:lstStyle/>
-          <a:p>
-            <a:r>
-              <a:rPr lang="en-US" dirty="0" smtClean="0"/>
-              <a:t>FAAS</a:t>
-            </a:r>
-            <a:endParaRPr lang="en-US" dirty="0"/>
-          </a:p>
-        </p:txBody>
-      </p:sp>
-      <p:sp>
-        <p:nvSpPr>
-          <p:cNvPr id="5" name="Text Placeholder 4"/>
-          <p:cNvSpPr>
-            <a:spLocks noGrp="1"/>
-          </p:cNvSpPr>
-          <p:nvPr>
-            <p:ph type="body" idx="1"/>
-          </p:nvPr>
-        </p:nvSpPr>
-        <p:spPr/>
-        <p:txBody>
-          <a:bodyPr/>
-          <a:lstStyle/>
-          <a:p>
-            <a:endParaRPr lang="en-US"/>
-          </a:p>
-        </p:txBody>
-      </p:sp>
-    </p:spTree>
-    <p:extLst>
-      <p:ext uri="{BB962C8B-B14F-4D97-AF65-F5344CB8AC3E}">
-        <p14:creationId xmlns:p14="http://schemas.microsoft.com/office/powerpoint/2010/main" val="3711222291"/>
-      </p:ext>
-    </p:extLst>
-  </p:cSld>
-  <p:clrMapOvr>
-    <a:masterClrMapping/>
-  </p:clrMapOvr>
-</p:sld>
-</file>
-
-<file path=ppt/slides/slide26.xml><?xml version="1.0" encoding="utf-8"?>
-<p:sld xmlns:a="http://schemas.openxmlformats.org/drawingml/2006/main" xmlns:r="http://schemas.openxmlformats.org/officeDocument/2006/relationships" xmlns:p="http://schemas.openxmlformats.org/presentationml/2006/main">
-  <p:cSld>
-    <p:spTree>
-      <p:nvGrpSpPr>
-        <p:cNvPr id="1" name=""/>
-        <p:cNvGrpSpPr/>
-        <p:nvPr/>
-      </p:nvGrpSpPr>
-      <p:grpSpPr>
-        <a:xfrm>
-          <a:off x="0" y="0"/>
-          <a:ext cx="0" cy="0"/>
-          <a:chOff x="0" y="0"/>
-          <a:chExt cx="0" cy="0"/>
-        </a:xfrm>
-      </p:grpSpPr>
-      <p:sp>
-        <p:nvSpPr>
-          <p:cNvPr id="4" name="Title 3"/>
-          <p:cNvSpPr>
-            <a:spLocks noGrp="1"/>
-          </p:cNvSpPr>
-          <p:nvPr>
-            <p:ph type="title"/>
-          </p:nvPr>
-        </p:nvSpPr>
-        <p:spPr/>
-        <p:txBody>
-          <a:bodyPr/>
-          <a:lstStyle/>
-          <a:p>
-            <a:r>
-              <a:rPr lang="en-US" dirty="0" smtClean="0"/>
-              <a:t>FAAS</a:t>
-            </a:r>
-            <a:endParaRPr lang="en-US" dirty="0"/>
-          </a:p>
-        </p:txBody>
-      </p:sp>
-      <p:sp>
-        <p:nvSpPr>
-          <p:cNvPr id="5" name="Content Placeholder 4"/>
-          <p:cNvSpPr>
-            <a:spLocks noGrp="1"/>
-          </p:cNvSpPr>
-          <p:nvPr>
-            <p:ph idx="1"/>
-          </p:nvPr>
-        </p:nvSpPr>
-        <p:spPr/>
-        <p:txBody>
-          <a:bodyPr/>
-          <a:lstStyle/>
-          <a:p>
-            <a:r>
-              <a:rPr lang="en-US" dirty="0" smtClean="0"/>
-              <a:t>Real Property</a:t>
-            </a:r>
-          </a:p>
-          <a:p>
-            <a:r>
-              <a:rPr lang="en-US" dirty="0" smtClean="0"/>
-              <a:t>Real Property Unit</a:t>
-            </a:r>
-          </a:p>
-          <a:p>
-            <a:r>
-              <a:rPr lang="en-US" dirty="0" smtClean="0"/>
-              <a:t>FAAS</a:t>
-            </a:r>
-          </a:p>
-          <a:p>
-            <a:r>
-              <a:rPr lang="en-US" dirty="0" smtClean="0"/>
-              <a:t>FAAS List</a:t>
-            </a:r>
-          </a:p>
-          <a:p>
-            <a:r>
-              <a:rPr lang="en-US" dirty="0" smtClean="0"/>
-              <a:t>Previous FAAS</a:t>
-            </a:r>
-          </a:p>
-          <a:p>
-            <a:r>
-              <a:rPr lang="en-US" dirty="0" smtClean="0"/>
-              <a:t>FAAS Signatories</a:t>
-            </a:r>
-          </a:p>
-          <a:p>
-            <a:r>
-              <a:rPr lang="en-US" dirty="0" smtClean="0"/>
-              <a:t>FAAS Task</a:t>
-            </a:r>
-            <a:endParaRPr lang="en-US" dirty="0"/>
-          </a:p>
-        </p:txBody>
-      </p:sp>
-    </p:spTree>
-    <p:extLst>
-      <p:ext uri="{BB962C8B-B14F-4D97-AF65-F5344CB8AC3E}">
-        <p14:creationId xmlns:p14="http://schemas.microsoft.com/office/powerpoint/2010/main" val="827143702"/>
-      </p:ext>
-    </p:extLst>
-  </p:cSld>
-  <p:clrMapOvr>
-    <a:masterClrMapping/>
-  </p:clrMapOvr>
-</p:sld>
-</file>
-
 <file path=ppt/slides/slide27.xml><?xml version="1.0" encoding="utf-8"?>
 <p:sld xmlns:a="http://schemas.openxmlformats.org/drawingml/2006/main" xmlns:r="http://schemas.openxmlformats.org/officeDocument/2006/relationships" xmlns:p="http://schemas.openxmlformats.org/presentationml/2006/main">
   <p:cSld>
@@ -6285,7 +7378,7 @@
           <a:p>
             <a:r>
               <a:rPr lang="en-US" dirty="0" smtClean="0"/>
-              <a:t>Real Property Units</a:t>
+              <a:t>FAAS</a:t>
             </a:r>
             <a:endParaRPr lang="en-US" dirty="0"/>
           </a:p>
@@ -6313,7 +7406,7 @@
     </p:spTree>
     <p:extLst>
       <p:ext uri="{BB962C8B-B14F-4D97-AF65-F5344CB8AC3E}">
-        <p14:creationId xmlns:p14="http://schemas.microsoft.com/office/powerpoint/2010/main" val="480874775"/>
+        <p14:creationId xmlns:p14="http://schemas.microsoft.com/office/powerpoint/2010/main" val="3711222291"/>
       </p:ext>
     </p:extLst>
   </p:cSld>
@@ -6357,7 +7450,7 @@
           <a:p>
             <a:r>
               <a:rPr lang="en-US" dirty="0" smtClean="0"/>
-              <a:t>Land RPU</a:t>
+              <a:t>FAAS</a:t>
             </a:r>
             <a:endParaRPr lang="en-US" dirty="0"/>
           </a:p>
@@ -6380,31 +7473,43 @@
           <a:p>
             <a:r>
               <a:rPr lang="en-US" dirty="0" smtClean="0"/>
-              <a:t>Land RPU</a:t>
-            </a:r>
-          </a:p>
-          <a:p>
-            <a:r>
-              <a:rPr lang="en-US" dirty="0" smtClean="0"/>
-              <a:t>Land Detail</a:t>
-            </a:r>
-          </a:p>
-          <a:p>
-            <a:r>
-              <a:rPr lang="en-US" dirty="0" smtClean="0"/>
-              <a:t>Land Value Adjustment</a:t>
-            </a:r>
-          </a:p>
-          <a:p>
-            <a:r>
-              <a:rPr lang="en-US" dirty="0" smtClean="0"/>
-              <a:t>Land Item Adjustment</a:t>
-            </a:r>
-          </a:p>
-          <a:p>
-            <a:r>
-              <a:rPr lang="en-US" dirty="0" smtClean="0"/>
-              <a:t>Assessment</a:t>
+              <a:t>Real Property</a:t>
+            </a:r>
+          </a:p>
+          <a:p>
+            <a:r>
+              <a:rPr lang="en-US" dirty="0" smtClean="0"/>
+              <a:t>Real Property Unit</a:t>
+            </a:r>
+          </a:p>
+          <a:p>
+            <a:r>
+              <a:rPr lang="en-US" dirty="0" smtClean="0"/>
+              <a:t>FAAS</a:t>
+            </a:r>
+          </a:p>
+          <a:p>
+            <a:r>
+              <a:rPr lang="en-US" dirty="0" smtClean="0"/>
+              <a:t>FAAS List</a:t>
+            </a:r>
+          </a:p>
+          <a:p>
+            <a:r>
+              <a:rPr lang="en-US" dirty="0" smtClean="0"/>
+              <a:t>Previous FAAS</a:t>
+            </a:r>
+          </a:p>
+          <a:p>
+            <a:r>
+              <a:rPr lang="en-US" dirty="0" smtClean="0"/>
+              <a:t>FAAS Signatories</a:t>
+            </a:r>
+          </a:p>
+          <a:p>
+            <a:r>
+              <a:rPr lang="en-US" dirty="0" smtClean="0"/>
+              <a:t>FAAS Task</a:t>
             </a:r>
             <a:endParaRPr lang="en-US" dirty="0"/>
           </a:p>
@@ -6413,7 +7518,7 @@
     </p:spTree>
     <p:extLst>
       <p:ext uri="{BB962C8B-B14F-4D97-AF65-F5344CB8AC3E}">
-        <p14:creationId xmlns:p14="http://schemas.microsoft.com/office/powerpoint/2010/main" val="54093317"/>
+        <p14:creationId xmlns:p14="http://schemas.microsoft.com/office/powerpoint/2010/main" val="827143702"/>
       </p:ext>
     </p:extLst>
   </p:cSld>
@@ -6442,7 +7547,7 @@
       </p:grpSpPr>
       <p:sp>
         <p:nvSpPr>
-          <p:cNvPr id="4" name="Title 3"/>
+          <p:cNvPr id="2" name="Title 1"/>
           <p:cNvSpPr>
             <a:spLocks noGrp="1"/>
           </p:cNvSpPr>
@@ -6457,7 +7562,7 @@
           <a:p>
             <a:r>
               <a:rPr lang="en-US" dirty="0" smtClean="0"/>
-              <a:t>Building RPU</a:t>
+              <a:t>FAAS Structure</a:t>
             </a:r>
             <a:endParaRPr lang="en-US" dirty="0"/>
           </a:p>
@@ -6465,7 +7570,7 @@
       </p:sp>
       <p:sp>
         <p:nvSpPr>
-          <p:cNvPr id="5" name="Content Placeholder 4"/>
+          <p:cNvPr id="3" name="Content Placeholder 2"/>
           <p:cNvSpPr>
             <a:spLocks noGrp="1"/>
           </p:cNvSpPr>
@@ -6478,68 +7583,14 @@
           <a:bodyPr/>
           <a:lstStyle/>
           <a:p>
-            <a:r>
-              <a:rPr lang="en-US" dirty="0" smtClean="0"/>
-              <a:t>Building RPU</a:t>
-            </a:r>
-          </a:p>
-          <a:p>
-            <a:r>
-              <a:rPr lang="en-US" dirty="0" smtClean="0"/>
-              <a:t>Structures</a:t>
-            </a:r>
-          </a:p>
-          <a:p>
-            <a:r>
-              <a:rPr lang="en-US" dirty="0" smtClean="0"/>
-              <a:t>Structural Types</a:t>
-            </a:r>
-          </a:p>
-          <a:p>
-            <a:r>
-              <a:rPr lang="en-US" dirty="0" smtClean="0"/>
-              <a:t>Actual Uses</a:t>
-            </a:r>
-          </a:p>
-          <a:p>
-            <a:r>
-              <a:rPr lang="en-US" dirty="0" smtClean="0"/>
-              <a:t>Floor</a:t>
-            </a:r>
-          </a:p>
-          <a:p>
-            <a:r>
-              <a:rPr lang="en-US" dirty="0" smtClean="0"/>
-              <a:t>Floor Adjustments</a:t>
-            </a:r>
-          </a:p>
-          <a:p>
-            <a:r>
-              <a:rPr lang="en-US" dirty="0" smtClean="0"/>
-              <a:t>Adjustment Parameters</a:t>
-            </a:r>
-          </a:p>
-          <a:p>
-            <a:r>
-              <a:rPr lang="en-US" dirty="0"/>
-              <a:t>Assessment</a:t>
-            </a:r>
-          </a:p>
-          <a:p>
-            <a:endParaRPr lang="en-US" dirty="0" smtClean="0"/>
-          </a:p>
-          <a:p>
-            <a:endParaRPr lang="en-US" dirty="0" smtClean="0"/>
-          </a:p>
-          <a:p>
-            <a:endParaRPr lang="en-US" dirty="0"/>
+            <a:endParaRPr lang="en-US"/>
           </a:p>
         </p:txBody>
       </p:sp>
     </p:spTree>
     <p:extLst>
       <p:ext uri="{BB962C8B-B14F-4D97-AF65-F5344CB8AC3E}">
-        <p14:creationId xmlns:p14="http://schemas.microsoft.com/office/powerpoint/2010/main" val="4014961656"/>
+        <p14:creationId xmlns:p14="http://schemas.microsoft.com/office/powerpoint/2010/main" val="2103661759"/>
       </p:ext>
     </p:extLst>
   </p:cSld>
@@ -6706,7 +7757,7 @@
           <a:p>
             <a:r>
               <a:rPr lang="en-US" dirty="0" smtClean="0"/>
-              <a:t>Machinery RPU</a:t>
+              <a:t>Real Property Units</a:t>
             </a:r>
             <a:endParaRPr lang="en-US" dirty="0"/>
           </a:p>
@@ -6714,12 +7765,12 @@
       </p:sp>
       <p:sp>
         <p:nvSpPr>
-          <p:cNvPr id="5" name="Content Placeholder 4"/>
-          <p:cNvSpPr>
-            <a:spLocks noGrp="1"/>
-          </p:cNvSpPr>
-          <p:nvPr>
-            <p:ph idx="1"/>
+          <p:cNvPr id="5" name="Text Placeholder 4"/>
+          <p:cNvSpPr>
+            <a:spLocks noGrp="1"/>
+          </p:cNvSpPr>
+          <p:nvPr>
+            <p:ph type="body" idx="1"/>
           </p:nvPr>
         </p:nvSpPr>
         <p:spPr/>
@@ -6727,38 +7778,14 @@
           <a:bodyPr/>
           <a:lstStyle/>
           <a:p>
-            <a:r>
-              <a:rPr lang="en-US" dirty="0" smtClean="0"/>
-              <a:t>Machinery RPU</a:t>
-            </a:r>
-          </a:p>
-          <a:p>
-            <a:r>
-              <a:rPr lang="en-US" dirty="0" smtClean="0"/>
-              <a:t>Actual Uses</a:t>
-            </a:r>
-          </a:p>
-          <a:p>
-            <a:r>
-              <a:rPr lang="en-US" dirty="0" smtClean="0"/>
-              <a:t>Machine Detail</a:t>
-            </a:r>
-          </a:p>
-          <a:p>
-            <a:r>
-              <a:rPr lang="en-US" dirty="0"/>
-              <a:t>Assessment</a:t>
-            </a:r>
-          </a:p>
-          <a:p>
-            <a:endParaRPr lang="en-US" dirty="0" smtClean="0"/>
+            <a:endParaRPr lang="en-US"/>
           </a:p>
         </p:txBody>
       </p:sp>
     </p:spTree>
     <p:extLst>
       <p:ext uri="{BB962C8B-B14F-4D97-AF65-F5344CB8AC3E}">
-        <p14:creationId xmlns:p14="http://schemas.microsoft.com/office/powerpoint/2010/main" val="889115266"/>
+        <p14:creationId xmlns:p14="http://schemas.microsoft.com/office/powerpoint/2010/main" val="480874775"/>
       </p:ext>
     </p:extLst>
   </p:cSld>
@@ -6802,7 +7829,7 @@
           <a:p>
             <a:r>
               <a:rPr lang="en-US" dirty="0" smtClean="0"/>
-              <a:t>Plant/Tree RPU</a:t>
+              <a:t>Land RPU</a:t>
             </a:r>
             <a:endParaRPr lang="en-US" dirty="0"/>
           </a:p>
@@ -6825,36 +7852,40 @@
           <a:p>
             <a:r>
               <a:rPr lang="en-US" dirty="0" smtClean="0"/>
-              <a:t>Plant/Tree RPU</a:t>
-            </a:r>
-          </a:p>
-          <a:p>
-            <a:r>
-              <a:rPr lang="en-US" dirty="0" smtClean="0"/>
-              <a:t>Actual Uses</a:t>
-            </a:r>
-          </a:p>
-          <a:p>
-            <a:r>
-              <a:rPr lang="en-US" dirty="0" smtClean="0"/>
-              <a:t>Plant Tree Details</a:t>
-            </a:r>
-          </a:p>
-          <a:p>
-            <a:r>
-              <a:rPr lang="en-US" dirty="0"/>
+              <a:t>Land RPU</a:t>
+            </a:r>
+          </a:p>
+          <a:p>
+            <a:r>
+              <a:rPr lang="en-US" dirty="0" smtClean="0"/>
+              <a:t>Land Detail</a:t>
+            </a:r>
+          </a:p>
+          <a:p>
+            <a:r>
+              <a:rPr lang="en-US" dirty="0" smtClean="0"/>
+              <a:t>Land Value Adjustment</a:t>
+            </a:r>
+          </a:p>
+          <a:p>
+            <a:r>
+              <a:rPr lang="en-US" dirty="0" smtClean="0"/>
+              <a:t>Land Item Adjustment</a:t>
+            </a:r>
+          </a:p>
+          <a:p>
+            <a:r>
+              <a:rPr lang="en-US" dirty="0" smtClean="0"/>
               <a:t>Assessment</a:t>
             </a:r>
-          </a:p>
-          <a:p>
-            <a:endParaRPr lang="en-US" dirty="0" smtClean="0"/>
+            <a:endParaRPr lang="en-US" dirty="0"/>
           </a:p>
         </p:txBody>
       </p:sp>
     </p:spTree>
     <p:extLst>
       <p:ext uri="{BB962C8B-B14F-4D97-AF65-F5344CB8AC3E}">
-        <p14:creationId xmlns:p14="http://schemas.microsoft.com/office/powerpoint/2010/main" val="1882775170"/>
+        <p14:creationId xmlns:p14="http://schemas.microsoft.com/office/powerpoint/2010/main" val="54093317"/>
       </p:ext>
     </p:extLst>
   </p:cSld>
@@ -6898,7 +7929,7 @@
           <a:p>
             <a:r>
               <a:rPr lang="en-US" dirty="0" smtClean="0"/>
-              <a:t>Miscellaneous RPU</a:t>
+              <a:t>Building RPU</a:t>
             </a:r>
             <a:endParaRPr lang="en-US" dirty="0"/>
           </a:p>
@@ -6921,13 +7952,43 @@
           <a:p>
             <a:r>
               <a:rPr lang="en-US" dirty="0" smtClean="0"/>
-              <a:t>Miscellaneous RPU</a:t>
-            </a:r>
-          </a:p>
-          <a:p>
-            <a:r>
-              <a:rPr lang="en-US" dirty="0" smtClean="0"/>
-              <a:t>Miscellaneous Details</a:t>
+              <a:t>Building RPU</a:t>
+            </a:r>
+          </a:p>
+          <a:p>
+            <a:r>
+              <a:rPr lang="en-US" dirty="0" smtClean="0"/>
+              <a:t>Structures</a:t>
+            </a:r>
+          </a:p>
+          <a:p>
+            <a:r>
+              <a:rPr lang="en-US" dirty="0" smtClean="0"/>
+              <a:t>Structural Types</a:t>
+            </a:r>
+          </a:p>
+          <a:p>
+            <a:r>
+              <a:rPr lang="en-US" dirty="0" smtClean="0"/>
+              <a:t>Actual Uses</a:t>
+            </a:r>
+          </a:p>
+          <a:p>
+            <a:r>
+              <a:rPr lang="en-US" dirty="0" smtClean="0"/>
+              <a:t>Floor</a:t>
+            </a:r>
+          </a:p>
+          <a:p>
+            <a:r>
+              <a:rPr lang="en-US" dirty="0" smtClean="0"/>
+              <a:t>Floor Adjustments</a:t>
+            </a:r>
+          </a:p>
+          <a:p>
+            <a:r>
+              <a:rPr lang="en-US" dirty="0" smtClean="0"/>
+              <a:t>Adjustment Parameters</a:t>
             </a:r>
           </a:p>
           <a:p>
@@ -6938,13 +7999,19 @@
           </a:p>
           <a:p>
             <a:endParaRPr lang="en-US" dirty="0" smtClean="0"/>
+          </a:p>
+          <a:p>
+            <a:endParaRPr lang="en-US" dirty="0" smtClean="0"/>
+          </a:p>
+          <a:p>
+            <a:endParaRPr lang="en-US" dirty="0"/>
           </a:p>
         </p:txBody>
       </p:sp>
     </p:spTree>
     <p:extLst>
       <p:ext uri="{BB962C8B-B14F-4D97-AF65-F5344CB8AC3E}">
-        <p14:creationId xmlns:p14="http://schemas.microsoft.com/office/powerpoint/2010/main" val="1623242209"/>
+        <p14:creationId xmlns:p14="http://schemas.microsoft.com/office/powerpoint/2010/main" val="4014961656"/>
       </p:ext>
     </p:extLst>
   </p:cSld>
@@ -6988,6 +8055,288 @@
           <a:p>
             <a:r>
               <a:rPr lang="en-US" dirty="0" smtClean="0"/>
+              <a:t>Machinery RPU</a:t>
+            </a:r>
+            <a:endParaRPr lang="en-US" dirty="0"/>
+          </a:p>
+        </p:txBody>
+      </p:sp>
+      <p:sp>
+        <p:nvSpPr>
+          <p:cNvPr id="5" name="Content Placeholder 4"/>
+          <p:cNvSpPr>
+            <a:spLocks noGrp="1"/>
+          </p:cNvSpPr>
+          <p:nvPr>
+            <p:ph idx="1"/>
+          </p:nvPr>
+        </p:nvSpPr>
+        <p:spPr/>
+        <p:txBody>
+          <a:bodyPr/>
+          <a:lstStyle/>
+          <a:p>
+            <a:r>
+              <a:rPr lang="en-US" dirty="0" smtClean="0"/>
+              <a:t>Machinery RPU</a:t>
+            </a:r>
+          </a:p>
+          <a:p>
+            <a:r>
+              <a:rPr lang="en-US" dirty="0" smtClean="0"/>
+              <a:t>Actual Uses</a:t>
+            </a:r>
+          </a:p>
+          <a:p>
+            <a:r>
+              <a:rPr lang="en-US" dirty="0" smtClean="0"/>
+              <a:t>Machine Detail</a:t>
+            </a:r>
+          </a:p>
+          <a:p>
+            <a:r>
+              <a:rPr lang="en-US" dirty="0"/>
+              <a:t>Assessment</a:t>
+            </a:r>
+          </a:p>
+          <a:p>
+            <a:endParaRPr lang="en-US" dirty="0" smtClean="0"/>
+          </a:p>
+        </p:txBody>
+      </p:sp>
+    </p:spTree>
+    <p:extLst>
+      <p:ext uri="{BB962C8B-B14F-4D97-AF65-F5344CB8AC3E}">
+        <p14:creationId xmlns:p14="http://schemas.microsoft.com/office/powerpoint/2010/main" val="889115266"/>
+      </p:ext>
+    </p:extLst>
+  </p:cSld>
+  <p:clrMapOvr>
+    <a:masterClrMapping/>
+  </p:clrMapOvr>
+</p:sld>
+</file>
+
+<file path=ppt/slides/slide34.xml><?xml version="1.0" encoding="utf-8"?>
+<p:sld xmlns:a="http://schemas.openxmlformats.org/drawingml/2006/main" xmlns:r="http://schemas.openxmlformats.org/officeDocument/2006/relationships" xmlns:p="http://schemas.openxmlformats.org/presentationml/2006/main">
+  <p:cSld>
+    <p:spTree>
+      <p:nvGrpSpPr>
+        <p:cNvPr id="1" name=""/>
+        <p:cNvGrpSpPr/>
+        <p:nvPr/>
+      </p:nvGrpSpPr>
+      <p:grpSpPr>
+        <a:xfrm>
+          <a:off x="0" y="0"/>
+          <a:ext cx="0" cy="0"/>
+          <a:chOff x="0" y="0"/>
+          <a:chExt cx="0" cy="0"/>
+        </a:xfrm>
+      </p:grpSpPr>
+      <p:sp>
+        <p:nvSpPr>
+          <p:cNvPr id="4" name="Title 3"/>
+          <p:cNvSpPr>
+            <a:spLocks noGrp="1"/>
+          </p:cNvSpPr>
+          <p:nvPr>
+            <p:ph type="title"/>
+          </p:nvPr>
+        </p:nvSpPr>
+        <p:spPr/>
+        <p:txBody>
+          <a:bodyPr/>
+          <a:lstStyle/>
+          <a:p>
+            <a:r>
+              <a:rPr lang="en-US" dirty="0" smtClean="0"/>
+              <a:t>Plant/Tree RPU</a:t>
+            </a:r>
+            <a:endParaRPr lang="en-US" dirty="0"/>
+          </a:p>
+        </p:txBody>
+      </p:sp>
+      <p:sp>
+        <p:nvSpPr>
+          <p:cNvPr id="5" name="Content Placeholder 4"/>
+          <p:cNvSpPr>
+            <a:spLocks noGrp="1"/>
+          </p:cNvSpPr>
+          <p:nvPr>
+            <p:ph idx="1"/>
+          </p:nvPr>
+        </p:nvSpPr>
+        <p:spPr/>
+        <p:txBody>
+          <a:bodyPr/>
+          <a:lstStyle/>
+          <a:p>
+            <a:r>
+              <a:rPr lang="en-US" dirty="0" smtClean="0"/>
+              <a:t>Plant/Tree RPU</a:t>
+            </a:r>
+          </a:p>
+          <a:p>
+            <a:r>
+              <a:rPr lang="en-US" dirty="0" smtClean="0"/>
+              <a:t>Actual Uses</a:t>
+            </a:r>
+          </a:p>
+          <a:p>
+            <a:r>
+              <a:rPr lang="en-US" dirty="0" smtClean="0"/>
+              <a:t>Plant Tree Details</a:t>
+            </a:r>
+          </a:p>
+          <a:p>
+            <a:r>
+              <a:rPr lang="en-US" dirty="0"/>
+              <a:t>Assessment</a:t>
+            </a:r>
+          </a:p>
+          <a:p>
+            <a:endParaRPr lang="en-US" dirty="0" smtClean="0"/>
+          </a:p>
+        </p:txBody>
+      </p:sp>
+    </p:spTree>
+    <p:extLst>
+      <p:ext uri="{BB962C8B-B14F-4D97-AF65-F5344CB8AC3E}">
+        <p14:creationId xmlns:p14="http://schemas.microsoft.com/office/powerpoint/2010/main" val="1882775170"/>
+      </p:ext>
+    </p:extLst>
+  </p:cSld>
+  <p:clrMapOvr>
+    <a:masterClrMapping/>
+  </p:clrMapOvr>
+</p:sld>
+</file>
+
+<file path=ppt/slides/slide35.xml><?xml version="1.0" encoding="utf-8"?>
+<p:sld xmlns:a="http://schemas.openxmlformats.org/drawingml/2006/main" xmlns:r="http://schemas.openxmlformats.org/officeDocument/2006/relationships" xmlns:p="http://schemas.openxmlformats.org/presentationml/2006/main">
+  <p:cSld>
+    <p:spTree>
+      <p:nvGrpSpPr>
+        <p:cNvPr id="1" name=""/>
+        <p:cNvGrpSpPr/>
+        <p:nvPr/>
+      </p:nvGrpSpPr>
+      <p:grpSpPr>
+        <a:xfrm>
+          <a:off x="0" y="0"/>
+          <a:ext cx="0" cy="0"/>
+          <a:chOff x="0" y="0"/>
+          <a:chExt cx="0" cy="0"/>
+        </a:xfrm>
+      </p:grpSpPr>
+      <p:sp>
+        <p:nvSpPr>
+          <p:cNvPr id="4" name="Title 3"/>
+          <p:cNvSpPr>
+            <a:spLocks noGrp="1"/>
+          </p:cNvSpPr>
+          <p:nvPr>
+            <p:ph type="title"/>
+          </p:nvPr>
+        </p:nvSpPr>
+        <p:spPr/>
+        <p:txBody>
+          <a:bodyPr/>
+          <a:lstStyle/>
+          <a:p>
+            <a:r>
+              <a:rPr lang="en-US" dirty="0" smtClean="0"/>
+              <a:t>Miscellaneous RPU</a:t>
+            </a:r>
+            <a:endParaRPr lang="en-US" dirty="0"/>
+          </a:p>
+        </p:txBody>
+      </p:sp>
+      <p:sp>
+        <p:nvSpPr>
+          <p:cNvPr id="5" name="Content Placeholder 4"/>
+          <p:cNvSpPr>
+            <a:spLocks noGrp="1"/>
+          </p:cNvSpPr>
+          <p:nvPr>
+            <p:ph idx="1"/>
+          </p:nvPr>
+        </p:nvSpPr>
+        <p:spPr/>
+        <p:txBody>
+          <a:bodyPr/>
+          <a:lstStyle/>
+          <a:p>
+            <a:r>
+              <a:rPr lang="en-US" dirty="0" smtClean="0"/>
+              <a:t>Miscellaneous RPU</a:t>
+            </a:r>
+          </a:p>
+          <a:p>
+            <a:r>
+              <a:rPr lang="en-US" dirty="0" smtClean="0"/>
+              <a:t>Miscellaneous Details</a:t>
+            </a:r>
+          </a:p>
+          <a:p>
+            <a:r>
+              <a:rPr lang="en-US" dirty="0"/>
+              <a:t>Assessment</a:t>
+            </a:r>
+          </a:p>
+          <a:p>
+            <a:endParaRPr lang="en-US" dirty="0" smtClean="0"/>
+          </a:p>
+        </p:txBody>
+      </p:sp>
+    </p:spTree>
+    <p:extLst>
+      <p:ext uri="{BB962C8B-B14F-4D97-AF65-F5344CB8AC3E}">
+        <p14:creationId xmlns:p14="http://schemas.microsoft.com/office/powerpoint/2010/main" val="1623242209"/>
+      </p:ext>
+    </p:extLst>
+  </p:cSld>
+  <p:clrMapOvr>
+    <a:masterClrMapping/>
+  </p:clrMapOvr>
+</p:sld>
+</file>
+
+<file path=ppt/slides/slide36.xml><?xml version="1.0" encoding="utf-8"?>
+<p:sld xmlns:a="http://schemas.openxmlformats.org/drawingml/2006/main" xmlns:r="http://schemas.openxmlformats.org/officeDocument/2006/relationships" xmlns:p="http://schemas.openxmlformats.org/presentationml/2006/main">
+  <p:cSld>
+    <p:spTree>
+      <p:nvGrpSpPr>
+        <p:cNvPr id="1" name=""/>
+        <p:cNvGrpSpPr/>
+        <p:nvPr/>
+      </p:nvGrpSpPr>
+      <p:grpSpPr>
+        <a:xfrm>
+          <a:off x="0" y="0"/>
+          <a:ext cx="0" cy="0"/>
+          <a:chOff x="0" y="0"/>
+          <a:chExt cx="0" cy="0"/>
+        </a:xfrm>
+      </p:grpSpPr>
+      <p:sp>
+        <p:nvSpPr>
+          <p:cNvPr id="4" name="Title 3"/>
+          <p:cNvSpPr>
+            <a:spLocks noGrp="1"/>
+          </p:cNvSpPr>
+          <p:nvPr>
+            <p:ph type="title"/>
+          </p:nvPr>
+        </p:nvSpPr>
+        <p:spPr/>
+        <p:txBody>
+          <a:bodyPr/>
+          <a:lstStyle/>
+          <a:p>
+            <a:r>
+              <a:rPr lang="en-US" dirty="0" smtClean="0"/>
               <a:t>Transactions</a:t>
             </a:r>
             <a:endParaRPr lang="en-US" dirty="0"/>
@@ -7026,7 +8375,7 @@
 </p:sld>
 </file>
 
-<file path=ppt/slides/slide34.xml><?xml version="1.0" encoding="utf-8"?>
+<file path=ppt/slides/slide37.xml><?xml version="1.0" encoding="utf-8"?>
 <p:sld xmlns:a="http://schemas.openxmlformats.org/drawingml/2006/main" xmlns:r="http://schemas.openxmlformats.org/officeDocument/2006/relationships" xmlns:p="http://schemas.openxmlformats.org/presentationml/2006/main">
   <p:cSld>
     <p:spTree>

</xml_diff>